<commit_message>
Enhanced the slides on type conversions.
</commit_message>
<xml_diff>
--- a/Presentations/TypeConversion.pptx
+++ b/Presentations/TypeConversion.pptx
@@ -14,6 +14,18 @@
     <p:sldId id="262" r:id="rId8"/>
     <p:sldId id="263" r:id="rId9"/>
     <p:sldId id="264" r:id="rId10"/>
+    <p:sldId id="266" r:id="rId11"/>
+    <p:sldId id="267" r:id="rId12"/>
+    <p:sldId id="268" r:id="rId13"/>
+    <p:sldId id="272" r:id="rId14"/>
+    <p:sldId id="269" r:id="rId15"/>
+    <p:sldId id="270" r:id="rId16"/>
+    <p:sldId id="271" r:id="rId17"/>
+    <p:sldId id="273" r:id="rId18"/>
+    <p:sldId id="274" r:id="rId19"/>
+    <p:sldId id="275" r:id="rId20"/>
+    <p:sldId id="276" r:id="rId21"/>
+    <p:sldId id="277" r:id="rId22"/>
   </p:sldIdLst>
   <p:sldSz cx="12192000" cy="6858000"/>
   <p:notesSz cx="6858000" cy="9144000"/>
@@ -251,7 +263,7 @@
           <a:p>
             <a:fld id="{3CADBD16-5BFB-4D9F-9646-C75D1B53BBB6}" type="datetimeFigureOut">
               <a:rPr lang="en-US" smtClean="0"/>
-              <a:t>9/14/23</a:t>
+              <a:t>9/18/23</a:t>
             </a:fld>
             <a:endParaRPr lang="en-US"/>
           </a:p>
@@ -421,7 +433,7 @@
           <a:p>
             <a:fld id="{3CADBD16-5BFB-4D9F-9646-C75D1B53BBB6}" type="datetimeFigureOut">
               <a:rPr lang="en-US" smtClean="0"/>
-              <a:t>9/14/23</a:t>
+              <a:t>9/18/23</a:t>
             </a:fld>
             <a:endParaRPr lang="en-US"/>
           </a:p>
@@ -601,7 +613,7 @@
           <a:p>
             <a:fld id="{3CADBD16-5BFB-4D9F-9646-C75D1B53BBB6}" type="datetimeFigureOut">
               <a:rPr lang="en-US" smtClean="0"/>
-              <a:t>9/14/23</a:t>
+              <a:t>9/18/23</a:t>
             </a:fld>
             <a:endParaRPr lang="en-US"/>
           </a:p>
@@ -771,7 +783,7 @@
           <a:p>
             <a:fld id="{3CADBD16-5BFB-4D9F-9646-C75D1B53BBB6}" type="datetimeFigureOut">
               <a:rPr lang="en-US" smtClean="0"/>
-              <a:t>9/14/23</a:t>
+              <a:t>9/18/23</a:t>
             </a:fld>
             <a:endParaRPr lang="en-US"/>
           </a:p>
@@ -1017,7 +1029,7 @@
           <a:p>
             <a:fld id="{3CADBD16-5BFB-4D9F-9646-C75D1B53BBB6}" type="datetimeFigureOut">
               <a:rPr lang="en-US" smtClean="0"/>
-              <a:t>9/14/23</a:t>
+              <a:t>9/18/23</a:t>
             </a:fld>
             <a:endParaRPr lang="en-US"/>
           </a:p>
@@ -1249,7 +1261,7 @@
           <a:p>
             <a:fld id="{3CADBD16-5BFB-4D9F-9646-C75D1B53BBB6}" type="datetimeFigureOut">
               <a:rPr lang="en-US" smtClean="0"/>
-              <a:t>9/14/23</a:t>
+              <a:t>9/18/23</a:t>
             </a:fld>
             <a:endParaRPr lang="en-US"/>
           </a:p>
@@ -1616,7 +1628,7 @@
           <a:p>
             <a:fld id="{3CADBD16-5BFB-4D9F-9646-C75D1B53BBB6}" type="datetimeFigureOut">
               <a:rPr lang="en-US" smtClean="0"/>
-              <a:t>9/14/23</a:t>
+              <a:t>9/18/23</a:t>
             </a:fld>
             <a:endParaRPr lang="en-US"/>
           </a:p>
@@ -1734,7 +1746,7 @@
           <a:p>
             <a:fld id="{3CADBD16-5BFB-4D9F-9646-C75D1B53BBB6}" type="datetimeFigureOut">
               <a:rPr lang="en-US" smtClean="0"/>
-              <a:t>9/14/23</a:t>
+              <a:t>9/18/23</a:t>
             </a:fld>
             <a:endParaRPr lang="en-US"/>
           </a:p>
@@ -1829,7 +1841,7 @@
           <a:p>
             <a:fld id="{3CADBD16-5BFB-4D9F-9646-C75D1B53BBB6}" type="datetimeFigureOut">
               <a:rPr lang="en-US" smtClean="0"/>
-              <a:t>9/14/23</a:t>
+              <a:t>9/18/23</a:t>
             </a:fld>
             <a:endParaRPr lang="en-US"/>
           </a:p>
@@ -2106,7 +2118,7 @@
           <a:p>
             <a:fld id="{3CADBD16-5BFB-4D9F-9646-C75D1B53BBB6}" type="datetimeFigureOut">
               <a:rPr lang="en-US" smtClean="0"/>
-              <a:t>9/14/23</a:t>
+              <a:t>9/18/23</a:t>
             </a:fld>
             <a:endParaRPr lang="en-US"/>
           </a:p>
@@ -2363,7 +2375,7 @@
           <a:p>
             <a:fld id="{3CADBD16-5BFB-4D9F-9646-C75D1B53BBB6}" type="datetimeFigureOut">
               <a:rPr lang="en-US" smtClean="0"/>
-              <a:t>9/14/23</a:t>
+              <a:t>9/18/23</a:t>
             </a:fld>
             <a:endParaRPr lang="en-US"/>
           </a:p>
@@ -2577,7 +2589,7 @@
             <a:fld id="{3CADBD16-5BFB-4D9F-9646-C75D1B53BBB6}" type="datetimeFigureOut">
               <a:rPr lang="en-US" smtClean="0"/>
               <a:pPr/>
-              <a:t>9/14/23</a:t>
+              <a:t>9/18/23</a:t>
             </a:fld>
             <a:endParaRPr lang="en-US" dirty="0"/>
           </a:p>
@@ -3064,6 +3076,2745 @@
 </p:sld>
 </file>
 
+<file path=ppt/slides/slide10.xml><?xml version="1.0" encoding="utf-8"?>
+<p:sld xmlns:a="http://schemas.openxmlformats.org/drawingml/2006/main" xmlns:r="http://schemas.openxmlformats.org/officeDocument/2006/relationships" xmlns:p="http://schemas.openxmlformats.org/presentationml/2006/main">
+  <p:cSld>
+    <p:spTree>
+      <p:nvGrpSpPr>
+        <p:cNvPr id="1" name=""/>
+        <p:cNvGrpSpPr/>
+        <p:nvPr/>
+      </p:nvGrpSpPr>
+      <p:grpSpPr>
+        <a:xfrm>
+          <a:off x="0" y="0"/>
+          <a:ext cx="0" cy="0"/>
+          <a:chOff x="0" y="0"/>
+          <a:chExt cx="0" cy="0"/>
+        </a:xfrm>
+      </p:grpSpPr>
+      <p:sp>
+        <p:nvSpPr>
+          <p:cNvPr id="2" name="Title 1">
+            <a:extLst>
+              <a:ext uri="{FF2B5EF4-FFF2-40B4-BE49-F238E27FC236}">
+                <a16:creationId xmlns:a16="http://schemas.microsoft.com/office/drawing/2014/main" id="{00963CD5-89CA-126A-C521-0A018210F379}"/>
+              </a:ext>
+            </a:extLst>
+          </p:cNvPr>
+          <p:cNvSpPr>
+            <a:spLocks noGrp="1"/>
+          </p:cNvSpPr>
+          <p:nvPr>
+            <p:ph type="title"/>
+          </p:nvPr>
+        </p:nvSpPr>
+        <p:spPr/>
+        <p:txBody>
+          <a:bodyPr/>
+          <a:lstStyle/>
+          <a:p>
+            <a:r>
+              <a:rPr lang="en-US" dirty="0"/>
+              <a:t>Implicit Conversions</a:t>
+            </a:r>
+          </a:p>
+        </p:txBody>
+      </p:sp>
+      <p:sp>
+        <p:nvSpPr>
+          <p:cNvPr id="3" name="Content Placeholder 2">
+            <a:extLst>
+              <a:ext uri="{FF2B5EF4-FFF2-40B4-BE49-F238E27FC236}">
+                <a16:creationId xmlns:a16="http://schemas.microsoft.com/office/drawing/2014/main" id="{0CA19383-03AB-DCD4-3864-F89FF753C01E}"/>
+              </a:ext>
+            </a:extLst>
+          </p:cNvPr>
+          <p:cNvSpPr>
+            <a:spLocks noGrp="1"/>
+          </p:cNvSpPr>
+          <p:nvPr>
+            <p:ph idx="1"/>
+          </p:nvPr>
+        </p:nvSpPr>
+        <p:spPr/>
+        <p:txBody>
+          <a:bodyPr/>
+          <a:lstStyle/>
+          <a:p>
+            <a:r>
+              <a:rPr lang="en-US" dirty="0"/>
+              <a:t>The C++ compiler will convert between certain types implicitly</a:t>
+            </a:r>
+          </a:p>
+          <a:p>
+            <a:pPr lvl="1"/>
+            <a:r>
+              <a:rPr lang="en-US" dirty="0"/>
+              <a:t>There is a school of thought that says all implicit conversions are bad for you</a:t>
+            </a:r>
+          </a:p>
+          <a:p>
+            <a:pPr lvl="1"/>
+            <a:r>
+              <a:rPr lang="en-US" dirty="0"/>
+              <a:t>… but many are convenient and completely safe</a:t>
+            </a:r>
+          </a:p>
+          <a:p>
+            <a:r>
+              <a:rPr lang="en-US" dirty="0"/>
+              <a:t>Integer promotions</a:t>
+            </a:r>
+          </a:p>
+          <a:p>
+            <a:r>
+              <a:rPr lang="en-US" dirty="0"/>
+              <a:t>Arithmetic conversions</a:t>
+            </a:r>
+          </a:p>
+          <a:p>
+            <a:r>
+              <a:rPr lang="en-US" dirty="0"/>
+              <a:t>Signed/Unsigned conversions</a:t>
+            </a:r>
+          </a:p>
+          <a:p>
+            <a:r>
+              <a:rPr lang="en-US" dirty="0"/>
+              <a:t>User-defined conversions</a:t>
+            </a:r>
+          </a:p>
+        </p:txBody>
+      </p:sp>
+    </p:spTree>
+    <p:extLst>
+      <p:ext uri="{BB962C8B-B14F-4D97-AF65-F5344CB8AC3E}">
+        <p14:creationId xmlns:p14="http://schemas.microsoft.com/office/powerpoint/2010/main" val="2185617116"/>
+      </p:ext>
+    </p:extLst>
+  </p:cSld>
+  <p:clrMapOvr>
+    <a:masterClrMapping/>
+  </p:clrMapOvr>
+</p:sld>
+</file>
+
+<file path=ppt/slides/slide11.xml><?xml version="1.0" encoding="utf-8"?>
+<p:sld xmlns:a="http://schemas.openxmlformats.org/drawingml/2006/main" xmlns:r="http://schemas.openxmlformats.org/officeDocument/2006/relationships" xmlns:p="http://schemas.openxmlformats.org/presentationml/2006/main">
+  <p:cSld>
+    <p:spTree>
+      <p:nvGrpSpPr>
+        <p:cNvPr id="1" name=""/>
+        <p:cNvGrpSpPr/>
+        <p:nvPr/>
+      </p:nvGrpSpPr>
+      <p:grpSpPr>
+        <a:xfrm>
+          <a:off x="0" y="0"/>
+          <a:ext cx="0" cy="0"/>
+          <a:chOff x="0" y="0"/>
+          <a:chExt cx="0" cy="0"/>
+        </a:xfrm>
+      </p:grpSpPr>
+      <p:sp>
+        <p:nvSpPr>
+          <p:cNvPr id="2" name="Title 1">
+            <a:extLst>
+              <a:ext uri="{FF2B5EF4-FFF2-40B4-BE49-F238E27FC236}">
+                <a16:creationId xmlns:a16="http://schemas.microsoft.com/office/drawing/2014/main" id="{8898029B-B4F6-0241-E1BB-B4E0AA189279}"/>
+              </a:ext>
+            </a:extLst>
+          </p:cNvPr>
+          <p:cNvSpPr>
+            <a:spLocks noGrp="1"/>
+          </p:cNvSpPr>
+          <p:nvPr>
+            <p:ph type="title"/>
+          </p:nvPr>
+        </p:nvSpPr>
+        <p:spPr/>
+        <p:txBody>
+          <a:bodyPr/>
+          <a:lstStyle/>
+          <a:p>
+            <a:r>
+              <a:rPr lang="en-US" dirty="0"/>
+              <a:t>Integer Promotions</a:t>
+            </a:r>
+          </a:p>
+        </p:txBody>
+      </p:sp>
+      <p:sp>
+        <p:nvSpPr>
+          <p:cNvPr id="3" name="Content Placeholder 2">
+            <a:extLst>
+              <a:ext uri="{FF2B5EF4-FFF2-40B4-BE49-F238E27FC236}">
+                <a16:creationId xmlns:a16="http://schemas.microsoft.com/office/drawing/2014/main" id="{CF158F7B-5835-1B1B-3698-2BC04F003AE5}"/>
+              </a:ext>
+            </a:extLst>
+          </p:cNvPr>
+          <p:cNvSpPr>
+            <a:spLocks noGrp="1"/>
+          </p:cNvSpPr>
+          <p:nvPr>
+            <p:ph idx="1"/>
+          </p:nvPr>
+        </p:nvSpPr>
+        <p:spPr/>
+        <p:txBody>
+          <a:bodyPr/>
+          <a:lstStyle/>
+          <a:p>
+            <a:r>
+              <a:rPr lang="en-US" dirty="0"/>
+              <a:t>Integer promotions are implicit conversions from a narrow integer to a wider integer. They are completely safe.</a:t>
+            </a:r>
+          </a:p>
+          <a:p>
+            <a:pPr lvl="1"/>
+            <a:r>
+              <a:rPr lang="en-US" b="1" dirty="0"/>
+              <a:t>short</a:t>
+            </a:r>
+            <a:r>
+              <a:rPr lang="en-US" dirty="0"/>
+              <a:t> → </a:t>
+            </a:r>
+            <a:r>
+              <a:rPr lang="en-US" b="1" dirty="0"/>
+              <a:t>int</a:t>
+            </a:r>
+          </a:p>
+          <a:p>
+            <a:pPr lvl="1"/>
+            <a:r>
+              <a:rPr lang="en-US" b="1" dirty="0"/>
+              <a:t>int</a:t>
+            </a:r>
+            <a:r>
+              <a:rPr lang="en-US" dirty="0"/>
+              <a:t> → </a:t>
+            </a:r>
+            <a:r>
+              <a:rPr lang="en-US" b="1" dirty="0"/>
+              <a:t>long</a:t>
+            </a:r>
+          </a:p>
+          <a:p>
+            <a:pPr lvl="1"/>
+            <a:r>
+              <a:rPr lang="en-US" dirty="0" err="1"/>
+              <a:t>etc</a:t>
+            </a:r>
+            <a:r>
+              <a:rPr lang="en-US" dirty="0"/>
+              <a:t>…</a:t>
+            </a:r>
+          </a:p>
+        </p:txBody>
+      </p:sp>
+      <p:sp>
+        <p:nvSpPr>
+          <p:cNvPr id="4" name="TextBox 3">
+            <a:extLst>
+              <a:ext uri="{FF2B5EF4-FFF2-40B4-BE49-F238E27FC236}">
+                <a16:creationId xmlns:a16="http://schemas.microsoft.com/office/drawing/2014/main" id="{52FE5AAB-5BB9-08DB-7D80-F251F1C391CC}"/>
+              </a:ext>
+            </a:extLst>
+          </p:cNvPr>
+          <p:cNvSpPr txBox="1"/>
+          <p:nvPr/>
+        </p:nvSpPr>
+        <p:spPr>
+          <a:xfrm>
+            <a:off x="938178" y="4169228"/>
+            <a:ext cx="10315644" cy="923330"/>
+          </a:xfrm>
+          <a:prstGeom prst="rect">
+            <a:avLst/>
+          </a:prstGeom>
+          <a:noFill/>
+        </p:spPr>
+        <p:txBody>
+          <a:bodyPr wrap="none" rtlCol="0">
+            <a:spAutoFit/>
+          </a:bodyPr>
+          <a:lstStyle/>
+          <a:p>
+            <a:r>
+              <a:rPr lang="en-US" b="1" dirty="0">
+                <a:latin typeface="Consolas" panose="020B0609020204030204" pitchFamily="49" charset="0"/>
+                <a:cs typeface="Consolas" panose="020B0609020204030204" pitchFamily="49" charset="0"/>
+              </a:rPr>
+              <a:t>int</a:t>
+            </a:r>
+            <a:r>
+              <a:rPr lang="en-US" dirty="0">
+                <a:latin typeface="Consolas" panose="020B0609020204030204" pitchFamily="49" charset="0"/>
+                <a:cs typeface="Consolas" panose="020B0609020204030204" pitchFamily="49" charset="0"/>
+              </a:rPr>
+              <a:t> </a:t>
+            </a:r>
+            <a:r>
+              <a:rPr lang="en-US" dirty="0" err="1">
+                <a:latin typeface="Consolas" panose="020B0609020204030204" pitchFamily="49" charset="0"/>
+                <a:cs typeface="Consolas" panose="020B0609020204030204" pitchFamily="49" charset="0"/>
+              </a:rPr>
+              <a:t>count_special_things</a:t>
+            </a:r>
+            <a:r>
+              <a:rPr lang="en-US" dirty="0">
+                <a:latin typeface="Consolas" panose="020B0609020204030204" pitchFamily="49" charset="0"/>
+                <a:cs typeface="Consolas" panose="020B0609020204030204" pitchFamily="49" charset="0"/>
+              </a:rPr>
+              <a:t>( </a:t>
+            </a:r>
+            <a:r>
+              <a:rPr lang="en-US" b="1" dirty="0">
+                <a:latin typeface="Consolas" panose="020B0609020204030204" pitchFamily="49" charset="0"/>
+                <a:cs typeface="Consolas" panose="020B0609020204030204" pitchFamily="49" charset="0"/>
+              </a:rPr>
+              <a:t>const</a:t>
+            </a:r>
+            <a:r>
+              <a:rPr lang="en-US" dirty="0">
+                <a:latin typeface="Consolas" panose="020B0609020204030204" pitchFamily="49" charset="0"/>
+                <a:cs typeface="Consolas" panose="020B0609020204030204" pitchFamily="49" charset="0"/>
+              </a:rPr>
+              <a:t> std::vector&lt;Thing&gt; &amp;</a:t>
+            </a:r>
+            <a:r>
+              <a:rPr lang="en-US" dirty="0" err="1">
+                <a:latin typeface="Consolas" panose="020B0609020204030204" pitchFamily="49" charset="0"/>
+                <a:cs typeface="Consolas" panose="020B0609020204030204" pitchFamily="49" charset="0"/>
+              </a:rPr>
+              <a:t>vec</a:t>
+            </a:r>
+            <a:r>
+              <a:rPr lang="en-US" dirty="0">
+                <a:latin typeface="Consolas" panose="020B0609020204030204" pitchFamily="49" charset="0"/>
+                <a:cs typeface="Consolas" panose="020B0609020204030204" pitchFamily="49" charset="0"/>
+              </a:rPr>
+              <a:t>, </a:t>
+            </a:r>
+            <a:r>
+              <a:rPr lang="en-US" b="1" dirty="0">
+                <a:latin typeface="Consolas" panose="020B0609020204030204" pitchFamily="49" charset="0"/>
+                <a:cs typeface="Consolas" panose="020B0609020204030204" pitchFamily="49" charset="0"/>
+              </a:rPr>
+              <a:t>const</a:t>
+            </a:r>
+            <a:r>
+              <a:rPr lang="en-US" dirty="0">
+                <a:latin typeface="Consolas" panose="020B0609020204030204" pitchFamily="49" charset="0"/>
+                <a:cs typeface="Consolas" panose="020B0609020204030204" pitchFamily="49" charset="0"/>
+              </a:rPr>
+              <a:t> Thing &amp;</a:t>
+            </a:r>
+            <a:r>
+              <a:rPr lang="en-US" dirty="0" err="1">
+                <a:latin typeface="Consolas" panose="020B0609020204030204" pitchFamily="49" charset="0"/>
+                <a:cs typeface="Consolas" panose="020B0609020204030204" pitchFamily="49" charset="0"/>
+              </a:rPr>
+              <a:t>a_thing</a:t>
+            </a:r>
+            <a:r>
+              <a:rPr lang="en-US" dirty="0">
+                <a:latin typeface="Consolas" panose="020B0609020204030204" pitchFamily="49" charset="0"/>
+                <a:cs typeface="Consolas" panose="020B0609020204030204" pitchFamily="49" charset="0"/>
+              </a:rPr>
+              <a:t> );</a:t>
+            </a:r>
+          </a:p>
+          <a:p>
+            <a:endParaRPr lang="en-US" dirty="0">
+              <a:latin typeface="Consolas" panose="020B0609020204030204" pitchFamily="49" charset="0"/>
+              <a:cs typeface="Consolas" panose="020B0609020204030204" pitchFamily="49" charset="0"/>
+            </a:endParaRPr>
+          </a:p>
+          <a:p>
+            <a:r>
+              <a:rPr lang="en-US" b="1" dirty="0">
+                <a:latin typeface="Consolas" panose="020B0609020204030204" pitchFamily="49" charset="0"/>
+                <a:cs typeface="Consolas" panose="020B0609020204030204" pitchFamily="49" charset="0"/>
+              </a:rPr>
+              <a:t>long</a:t>
+            </a:r>
+            <a:r>
+              <a:rPr lang="en-US" dirty="0">
+                <a:latin typeface="Consolas" panose="020B0609020204030204" pitchFamily="49" charset="0"/>
+                <a:cs typeface="Consolas" panose="020B0609020204030204" pitchFamily="49" charset="0"/>
+              </a:rPr>
+              <a:t> count = </a:t>
+            </a:r>
+            <a:r>
+              <a:rPr lang="en-US" dirty="0" err="1">
+                <a:latin typeface="Consolas" panose="020B0609020204030204" pitchFamily="49" charset="0"/>
+                <a:cs typeface="Consolas" panose="020B0609020204030204" pitchFamily="49" charset="0"/>
+              </a:rPr>
+              <a:t>count_special_things</a:t>
+            </a:r>
+            <a:r>
+              <a:rPr lang="en-US" dirty="0">
+                <a:latin typeface="Consolas" panose="020B0609020204030204" pitchFamily="49" charset="0"/>
+                <a:cs typeface="Consolas" panose="020B0609020204030204" pitchFamily="49" charset="0"/>
+              </a:rPr>
+              <a:t>( </a:t>
+            </a:r>
+            <a:r>
+              <a:rPr lang="en-US" dirty="0" err="1">
+                <a:latin typeface="Consolas" panose="020B0609020204030204" pitchFamily="49" charset="0"/>
+                <a:cs typeface="Consolas" panose="020B0609020204030204" pitchFamily="49" charset="0"/>
+              </a:rPr>
+              <a:t>some_vector</a:t>
+            </a:r>
+            <a:r>
+              <a:rPr lang="en-US" dirty="0">
+                <a:latin typeface="Consolas" panose="020B0609020204030204" pitchFamily="49" charset="0"/>
+                <a:cs typeface="Consolas" panose="020B0609020204030204" pitchFamily="49" charset="0"/>
+              </a:rPr>
+              <a:t>, </a:t>
+            </a:r>
+            <a:r>
+              <a:rPr lang="en-US" dirty="0" err="1">
+                <a:latin typeface="Consolas" panose="020B0609020204030204" pitchFamily="49" charset="0"/>
+                <a:cs typeface="Consolas" panose="020B0609020204030204" pitchFamily="49" charset="0"/>
+              </a:rPr>
+              <a:t>some_thing</a:t>
+            </a:r>
+            <a:r>
+              <a:rPr lang="en-US" dirty="0">
+                <a:latin typeface="Consolas" panose="020B0609020204030204" pitchFamily="49" charset="0"/>
+                <a:cs typeface="Consolas" panose="020B0609020204030204" pitchFamily="49" charset="0"/>
+              </a:rPr>
+              <a:t> );</a:t>
+            </a:r>
+          </a:p>
+        </p:txBody>
+      </p:sp>
+      <p:sp>
+        <p:nvSpPr>
+          <p:cNvPr id="5" name="TextBox 4">
+            <a:extLst>
+              <a:ext uri="{FF2B5EF4-FFF2-40B4-BE49-F238E27FC236}">
+                <a16:creationId xmlns:a16="http://schemas.microsoft.com/office/drawing/2014/main" id="{82DDD421-1BCA-3183-03E4-B673857204EE}"/>
+              </a:ext>
+            </a:extLst>
+          </p:cNvPr>
+          <p:cNvSpPr txBox="1"/>
+          <p:nvPr/>
+        </p:nvSpPr>
+        <p:spPr>
+          <a:xfrm>
+            <a:off x="3276600" y="5388570"/>
+            <a:ext cx="4691925" cy="923330"/>
+          </a:xfrm>
+          <a:prstGeom prst="rect">
+            <a:avLst/>
+          </a:prstGeom>
+          <a:noFill/>
+        </p:spPr>
+        <p:txBody>
+          <a:bodyPr wrap="none" rtlCol="0">
+            <a:spAutoFit/>
+          </a:bodyPr>
+          <a:lstStyle/>
+          <a:p>
+            <a:r>
+              <a:rPr lang="en-US" dirty="0"/>
+              <a:t>Implicit conversion from </a:t>
+            </a:r>
+            <a:r>
+              <a:rPr lang="en-US" b="1" dirty="0">
+                <a:latin typeface="Consolas" panose="020B0609020204030204" pitchFamily="49" charset="0"/>
+                <a:cs typeface="Consolas" panose="020B0609020204030204" pitchFamily="49" charset="0"/>
+              </a:rPr>
+              <a:t>int</a:t>
+            </a:r>
+            <a:r>
+              <a:rPr lang="en-US" dirty="0"/>
+              <a:t> to </a:t>
+            </a:r>
+            <a:r>
+              <a:rPr lang="en-US" b="1" dirty="0">
+                <a:latin typeface="Consolas" panose="020B0609020204030204" pitchFamily="49" charset="0"/>
+                <a:cs typeface="Consolas" panose="020B0609020204030204" pitchFamily="49" charset="0"/>
+              </a:rPr>
+              <a:t>long</a:t>
+            </a:r>
+            <a:r>
+              <a:rPr lang="en-US" dirty="0"/>
+              <a:t>.</a:t>
+            </a:r>
+          </a:p>
+          <a:p>
+            <a:r>
+              <a:rPr lang="en-US" dirty="0"/>
+              <a:t>No possible loss of information on any platform.</a:t>
+            </a:r>
+          </a:p>
+          <a:p>
+            <a:r>
+              <a:rPr lang="en-US" dirty="0"/>
+              <a:t>No compiler warning.</a:t>
+            </a:r>
+          </a:p>
+        </p:txBody>
+      </p:sp>
+      <p:cxnSp>
+        <p:nvCxnSpPr>
+          <p:cNvPr id="7" name="Straight Arrow Connector 6">
+            <a:extLst>
+              <a:ext uri="{FF2B5EF4-FFF2-40B4-BE49-F238E27FC236}">
+                <a16:creationId xmlns:a16="http://schemas.microsoft.com/office/drawing/2014/main" id="{6B09EB93-9F00-08AA-2155-C1F06F3982FC}"/>
+              </a:ext>
+            </a:extLst>
+          </p:cNvPr>
+          <p:cNvCxnSpPr>
+            <a:stCxn id="5" idx="1"/>
+          </p:cNvCxnSpPr>
+          <p:nvPr/>
+        </p:nvCxnSpPr>
+        <p:spPr>
+          <a:xfrm flipH="1" flipV="1">
+            <a:off x="2645229" y="5092558"/>
+            <a:ext cx="631371" cy="757677"/>
+          </a:xfrm>
+          <a:prstGeom prst="straightConnector1">
+            <a:avLst/>
+          </a:prstGeom>
+          <a:ln>
+            <a:tailEnd type="triangle"/>
+          </a:ln>
+        </p:spPr>
+        <p:style>
+          <a:lnRef idx="1">
+            <a:schemeClr val="accent1"/>
+          </a:lnRef>
+          <a:fillRef idx="0">
+            <a:schemeClr val="accent1"/>
+          </a:fillRef>
+          <a:effectRef idx="0">
+            <a:schemeClr val="accent1"/>
+          </a:effectRef>
+          <a:fontRef idx="minor">
+            <a:schemeClr val="tx1"/>
+          </a:fontRef>
+        </p:style>
+      </p:cxnSp>
+    </p:spTree>
+    <p:extLst>
+      <p:ext uri="{BB962C8B-B14F-4D97-AF65-F5344CB8AC3E}">
+        <p14:creationId xmlns:p14="http://schemas.microsoft.com/office/powerpoint/2010/main" val="3092929684"/>
+      </p:ext>
+    </p:extLst>
+  </p:cSld>
+  <p:clrMapOvr>
+    <a:masterClrMapping/>
+  </p:clrMapOvr>
+</p:sld>
+</file>
+
+<file path=ppt/slides/slide12.xml><?xml version="1.0" encoding="utf-8"?>
+<p:sld xmlns:a="http://schemas.openxmlformats.org/drawingml/2006/main" xmlns:r="http://schemas.openxmlformats.org/officeDocument/2006/relationships" xmlns:p="http://schemas.openxmlformats.org/presentationml/2006/main">
+  <p:cSld>
+    <p:spTree>
+      <p:nvGrpSpPr>
+        <p:cNvPr id="1" name=""/>
+        <p:cNvGrpSpPr/>
+        <p:nvPr/>
+      </p:nvGrpSpPr>
+      <p:grpSpPr>
+        <a:xfrm>
+          <a:off x="0" y="0"/>
+          <a:ext cx="0" cy="0"/>
+          <a:chOff x="0" y="0"/>
+          <a:chExt cx="0" cy="0"/>
+        </a:xfrm>
+      </p:grpSpPr>
+      <p:sp>
+        <p:nvSpPr>
+          <p:cNvPr id="2" name="Title 1">
+            <a:extLst>
+              <a:ext uri="{FF2B5EF4-FFF2-40B4-BE49-F238E27FC236}">
+                <a16:creationId xmlns:a16="http://schemas.microsoft.com/office/drawing/2014/main" id="{5C4022F8-E1B8-FC6F-5719-1007CF0AE277}"/>
+              </a:ext>
+            </a:extLst>
+          </p:cNvPr>
+          <p:cNvSpPr>
+            <a:spLocks noGrp="1"/>
+          </p:cNvSpPr>
+          <p:nvPr>
+            <p:ph type="title"/>
+          </p:nvPr>
+        </p:nvSpPr>
+        <p:spPr/>
+        <p:txBody>
+          <a:bodyPr/>
+          <a:lstStyle/>
+          <a:p>
+            <a:r>
+              <a:rPr lang="en-US" dirty="0"/>
+              <a:t>Arithmetic Conversions</a:t>
+            </a:r>
+          </a:p>
+        </p:txBody>
+      </p:sp>
+      <p:sp>
+        <p:nvSpPr>
+          <p:cNvPr id="3" name="Content Placeholder 2">
+            <a:extLst>
+              <a:ext uri="{FF2B5EF4-FFF2-40B4-BE49-F238E27FC236}">
+                <a16:creationId xmlns:a16="http://schemas.microsoft.com/office/drawing/2014/main" id="{75E60A60-D61F-FAED-7DB6-EA5ADAC6C8B0}"/>
+              </a:ext>
+            </a:extLst>
+          </p:cNvPr>
+          <p:cNvSpPr>
+            <a:spLocks noGrp="1"/>
+          </p:cNvSpPr>
+          <p:nvPr>
+            <p:ph idx="1"/>
+          </p:nvPr>
+        </p:nvSpPr>
+        <p:spPr/>
+        <p:txBody>
+          <a:bodyPr/>
+          <a:lstStyle/>
+          <a:p>
+            <a:r>
+              <a:rPr lang="en-US" dirty="0"/>
+              <a:t>Includes Integer promotions, but also </a:t>
+            </a:r>
+            <a:r>
+              <a:rPr lang="en-US" i="1" dirty="0"/>
+              <a:t>unsafe</a:t>
+            </a:r>
+            <a:r>
+              <a:rPr lang="en-US" dirty="0"/>
+              <a:t> conversions</a:t>
+            </a:r>
+          </a:p>
+          <a:p>
+            <a:pPr lvl="1"/>
+            <a:r>
+              <a:rPr lang="en-US" b="1" dirty="0"/>
+              <a:t>long</a:t>
+            </a:r>
+            <a:r>
+              <a:rPr lang="en-US" dirty="0"/>
+              <a:t> → </a:t>
+            </a:r>
+            <a:r>
+              <a:rPr lang="en-US" b="1" dirty="0"/>
+              <a:t>int</a:t>
+            </a:r>
+          </a:p>
+          <a:p>
+            <a:pPr lvl="1"/>
+            <a:r>
+              <a:rPr lang="en-US" b="1" dirty="0"/>
+              <a:t>int</a:t>
+            </a:r>
+            <a:r>
+              <a:rPr lang="en-US" dirty="0"/>
+              <a:t> → </a:t>
+            </a:r>
+            <a:r>
+              <a:rPr lang="en-US" b="1" dirty="0"/>
+              <a:t>short</a:t>
+            </a:r>
+            <a:endParaRPr lang="en-US" dirty="0"/>
+          </a:p>
+          <a:p>
+            <a:pPr lvl="1"/>
+            <a:r>
+              <a:rPr lang="en-US" b="1" dirty="0"/>
+              <a:t>unsigned int</a:t>
+            </a:r>
+            <a:r>
+              <a:rPr lang="en-US" dirty="0"/>
+              <a:t> → </a:t>
+            </a:r>
+            <a:r>
+              <a:rPr lang="en-US" b="1" dirty="0"/>
+              <a:t>int</a:t>
+            </a:r>
+          </a:p>
+          <a:p>
+            <a:pPr lvl="1"/>
+            <a:r>
+              <a:rPr lang="en-US" dirty="0" err="1"/>
+              <a:t>etc</a:t>
+            </a:r>
+            <a:r>
+              <a:rPr lang="en-US" dirty="0"/>
+              <a:t>…</a:t>
+            </a:r>
+          </a:p>
+        </p:txBody>
+      </p:sp>
+      <p:sp>
+        <p:nvSpPr>
+          <p:cNvPr id="7" name="TextBox 6">
+            <a:extLst>
+              <a:ext uri="{FF2B5EF4-FFF2-40B4-BE49-F238E27FC236}">
+                <a16:creationId xmlns:a16="http://schemas.microsoft.com/office/drawing/2014/main" id="{524D1C75-B89D-31EE-B051-31F88867A617}"/>
+              </a:ext>
+            </a:extLst>
+          </p:cNvPr>
+          <p:cNvSpPr txBox="1"/>
+          <p:nvPr/>
+        </p:nvSpPr>
+        <p:spPr>
+          <a:xfrm>
+            <a:off x="938178" y="4201885"/>
+            <a:ext cx="10315644" cy="923330"/>
+          </a:xfrm>
+          <a:prstGeom prst="rect">
+            <a:avLst/>
+          </a:prstGeom>
+          <a:noFill/>
+        </p:spPr>
+        <p:txBody>
+          <a:bodyPr wrap="none" rtlCol="0">
+            <a:spAutoFit/>
+          </a:bodyPr>
+          <a:lstStyle/>
+          <a:p>
+            <a:r>
+              <a:rPr lang="en-US" b="1" dirty="0">
+                <a:latin typeface="Consolas" panose="020B0609020204030204" pitchFamily="49" charset="0"/>
+                <a:cs typeface="Consolas" panose="020B0609020204030204" pitchFamily="49" charset="0"/>
+              </a:rPr>
+              <a:t>int</a:t>
+            </a:r>
+            <a:r>
+              <a:rPr lang="en-US" dirty="0">
+                <a:latin typeface="Consolas" panose="020B0609020204030204" pitchFamily="49" charset="0"/>
+                <a:cs typeface="Consolas" panose="020B0609020204030204" pitchFamily="49" charset="0"/>
+              </a:rPr>
+              <a:t> </a:t>
+            </a:r>
+            <a:r>
+              <a:rPr lang="en-US" dirty="0" err="1">
+                <a:latin typeface="Consolas" panose="020B0609020204030204" pitchFamily="49" charset="0"/>
+                <a:cs typeface="Consolas" panose="020B0609020204030204" pitchFamily="49" charset="0"/>
+              </a:rPr>
+              <a:t>count_special_things</a:t>
+            </a:r>
+            <a:r>
+              <a:rPr lang="en-US" dirty="0">
+                <a:latin typeface="Consolas" panose="020B0609020204030204" pitchFamily="49" charset="0"/>
+                <a:cs typeface="Consolas" panose="020B0609020204030204" pitchFamily="49" charset="0"/>
+              </a:rPr>
+              <a:t>( </a:t>
+            </a:r>
+            <a:r>
+              <a:rPr lang="en-US" b="1" dirty="0">
+                <a:latin typeface="Consolas" panose="020B0609020204030204" pitchFamily="49" charset="0"/>
+                <a:cs typeface="Consolas" panose="020B0609020204030204" pitchFamily="49" charset="0"/>
+              </a:rPr>
+              <a:t>const</a:t>
+            </a:r>
+            <a:r>
+              <a:rPr lang="en-US" dirty="0">
+                <a:latin typeface="Consolas" panose="020B0609020204030204" pitchFamily="49" charset="0"/>
+                <a:cs typeface="Consolas" panose="020B0609020204030204" pitchFamily="49" charset="0"/>
+              </a:rPr>
+              <a:t> std::vector&lt;Thing&gt; &amp;</a:t>
+            </a:r>
+            <a:r>
+              <a:rPr lang="en-US" dirty="0" err="1">
+                <a:latin typeface="Consolas" panose="020B0609020204030204" pitchFamily="49" charset="0"/>
+                <a:cs typeface="Consolas" panose="020B0609020204030204" pitchFamily="49" charset="0"/>
+              </a:rPr>
+              <a:t>vec</a:t>
+            </a:r>
+            <a:r>
+              <a:rPr lang="en-US" dirty="0">
+                <a:latin typeface="Consolas" panose="020B0609020204030204" pitchFamily="49" charset="0"/>
+                <a:cs typeface="Consolas" panose="020B0609020204030204" pitchFamily="49" charset="0"/>
+              </a:rPr>
+              <a:t>, </a:t>
+            </a:r>
+            <a:r>
+              <a:rPr lang="en-US" b="1" dirty="0">
+                <a:latin typeface="Consolas" panose="020B0609020204030204" pitchFamily="49" charset="0"/>
+                <a:cs typeface="Consolas" panose="020B0609020204030204" pitchFamily="49" charset="0"/>
+              </a:rPr>
+              <a:t>const</a:t>
+            </a:r>
+            <a:r>
+              <a:rPr lang="en-US" dirty="0">
+                <a:latin typeface="Consolas" panose="020B0609020204030204" pitchFamily="49" charset="0"/>
+                <a:cs typeface="Consolas" panose="020B0609020204030204" pitchFamily="49" charset="0"/>
+              </a:rPr>
+              <a:t> Thing &amp;</a:t>
+            </a:r>
+            <a:r>
+              <a:rPr lang="en-US" dirty="0" err="1">
+                <a:latin typeface="Consolas" panose="020B0609020204030204" pitchFamily="49" charset="0"/>
+                <a:cs typeface="Consolas" panose="020B0609020204030204" pitchFamily="49" charset="0"/>
+              </a:rPr>
+              <a:t>a_thing</a:t>
+            </a:r>
+            <a:r>
+              <a:rPr lang="en-US" dirty="0">
+                <a:latin typeface="Consolas" panose="020B0609020204030204" pitchFamily="49" charset="0"/>
+                <a:cs typeface="Consolas" panose="020B0609020204030204" pitchFamily="49" charset="0"/>
+              </a:rPr>
+              <a:t> );</a:t>
+            </a:r>
+          </a:p>
+          <a:p>
+            <a:endParaRPr lang="en-US" dirty="0">
+              <a:latin typeface="Consolas" panose="020B0609020204030204" pitchFamily="49" charset="0"/>
+              <a:cs typeface="Consolas" panose="020B0609020204030204" pitchFamily="49" charset="0"/>
+            </a:endParaRPr>
+          </a:p>
+          <a:p>
+            <a:r>
+              <a:rPr lang="en-US" b="1" dirty="0">
+                <a:latin typeface="Consolas" panose="020B0609020204030204" pitchFamily="49" charset="0"/>
+                <a:cs typeface="Consolas" panose="020B0609020204030204" pitchFamily="49" charset="0"/>
+              </a:rPr>
+              <a:t>short</a:t>
+            </a:r>
+            <a:r>
+              <a:rPr lang="en-US" dirty="0">
+                <a:latin typeface="Consolas" panose="020B0609020204030204" pitchFamily="49" charset="0"/>
+                <a:cs typeface="Consolas" panose="020B0609020204030204" pitchFamily="49" charset="0"/>
+              </a:rPr>
+              <a:t> count = </a:t>
+            </a:r>
+            <a:r>
+              <a:rPr lang="en-US" dirty="0" err="1">
+                <a:latin typeface="Consolas" panose="020B0609020204030204" pitchFamily="49" charset="0"/>
+                <a:cs typeface="Consolas" panose="020B0609020204030204" pitchFamily="49" charset="0"/>
+              </a:rPr>
+              <a:t>count_special_things</a:t>
+            </a:r>
+            <a:r>
+              <a:rPr lang="en-US" dirty="0">
+                <a:latin typeface="Consolas" panose="020B0609020204030204" pitchFamily="49" charset="0"/>
+                <a:cs typeface="Consolas" panose="020B0609020204030204" pitchFamily="49" charset="0"/>
+              </a:rPr>
+              <a:t>( </a:t>
+            </a:r>
+            <a:r>
+              <a:rPr lang="en-US" dirty="0" err="1">
+                <a:latin typeface="Consolas" panose="020B0609020204030204" pitchFamily="49" charset="0"/>
+                <a:cs typeface="Consolas" panose="020B0609020204030204" pitchFamily="49" charset="0"/>
+              </a:rPr>
+              <a:t>some_vector</a:t>
+            </a:r>
+            <a:r>
+              <a:rPr lang="en-US" dirty="0">
+                <a:latin typeface="Consolas" panose="020B0609020204030204" pitchFamily="49" charset="0"/>
+                <a:cs typeface="Consolas" panose="020B0609020204030204" pitchFamily="49" charset="0"/>
+              </a:rPr>
+              <a:t>, </a:t>
+            </a:r>
+            <a:r>
+              <a:rPr lang="en-US" dirty="0" err="1">
+                <a:latin typeface="Consolas" panose="020B0609020204030204" pitchFamily="49" charset="0"/>
+                <a:cs typeface="Consolas" panose="020B0609020204030204" pitchFamily="49" charset="0"/>
+              </a:rPr>
+              <a:t>some_thing</a:t>
+            </a:r>
+            <a:r>
+              <a:rPr lang="en-US" dirty="0">
+                <a:latin typeface="Consolas" panose="020B0609020204030204" pitchFamily="49" charset="0"/>
+                <a:cs typeface="Consolas" panose="020B0609020204030204" pitchFamily="49" charset="0"/>
+              </a:rPr>
+              <a:t> );</a:t>
+            </a:r>
+          </a:p>
+        </p:txBody>
+      </p:sp>
+      <p:sp>
+        <p:nvSpPr>
+          <p:cNvPr id="8" name="TextBox 7">
+            <a:extLst>
+              <a:ext uri="{FF2B5EF4-FFF2-40B4-BE49-F238E27FC236}">
+                <a16:creationId xmlns:a16="http://schemas.microsoft.com/office/drawing/2014/main" id="{CAA407DE-5F80-D992-DAA4-8B1E933E39D9}"/>
+              </a:ext>
+            </a:extLst>
+          </p:cNvPr>
+          <p:cNvSpPr txBox="1"/>
+          <p:nvPr/>
+        </p:nvSpPr>
+        <p:spPr>
+          <a:xfrm>
+            <a:off x="3276600" y="5388570"/>
+            <a:ext cx="7356373" cy="923330"/>
+          </a:xfrm>
+          <a:prstGeom prst="rect">
+            <a:avLst/>
+          </a:prstGeom>
+          <a:noFill/>
+        </p:spPr>
+        <p:txBody>
+          <a:bodyPr wrap="none" rtlCol="0">
+            <a:spAutoFit/>
+          </a:bodyPr>
+          <a:lstStyle/>
+          <a:p>
+            <a:r>
+              <a:rPr lang="en-US" dirty="0"/>
+              <a:t>Implicit conversion from </a:t>
+            </a:r>
+            <a:r>
+              <a:rPr lang="en-US" b="1" dirty="0">
+                <a:latin typeface="Consolas" panose="020B0609020204030204" pitchFamily="49" charset="0"/>
+                <a:cs typeface="Consolas" panose="020B0609020204030204" pitchFamily="49" charset="0"/>
+              </a:rPr>
+              <a:t>int</a:t>
+            </a:r>
+            <a:r>
+              <a:rPr lang="en-US" dirty="0"/>
+              <a:t> to </a:t>
+            </a:r>
+            <a:r>
+              <a:rPr lang="en-US" b="1" dirty="0">
+                <a:latin typeface="Consolas" panose="020B0609020204030204" pitchFamily="49" charset="0"/>
+                <a:cs typeface="Consolas" panose="020B0609020204030204" pitchFamily="49" charset="0"/>
+              </a:rPr>
+              <a:t>short</a:t>
+            </a:r>
+            <a:r>
+              <a:rPr lang="en-US" dirty="0"/>
+              <a:t>.</a:t>
+            </a:r>
+          </a:p>
+          <a:p>
+            <a:r>
+              <a:rPr lang="en-US" dirty="0"/>
+              <a:t>Possible loss of information on some platforms.</a:t>
+            </a:r>
+          </a:p>
+          <a:p>
+            <a:r>
+              <a:rPr lang="en-US" dirty="0"/>
+              <a:t>Compiler warning possible (likely on platforms that actually experience loss).</a:t>
+            </a:r>
+          </a:p>
+        </p:txBody>
+      </p:sp>
+      <p:cxnSp>
+        <p:nvCxnSpPr>
+          <p:cNvPr id="9" name="Straight Arrow Connector 8">
+            <a:extLst>
+              <a:ext uri="{FF2B5EF4-FFF2-40B4-BE49-F238E27FC236}">
+                <a16:creationId xmlns:a16="http://schemas.microsoft.com/office/drawing/2014/main" id="{C648ECFA-D032-0F4E-9210-1C49E20D3EC4}"/>
+              </a:ext>
+            </a:extLst>
+          </p:cNvPr>
+          <p:cNvCxnSpPr>
+            <a:cxnSpLocks/>
+          </p:cNvCxnSpPr>
+          <p:nvPr/>
+        </p:nvCxnSpPr>
+        <p:spPr>
+          <a:xfrm flipH="1" flipV="1">
+            <a:off x="2688771" y="5125215"/>
+            <a:ext cx="587829" cy="725020"/>
+          </a:xfrm>
+          <a:prstGeom prst="straightConnector1">
+            <a:avLst/>
+          </a:prstGeom>
+          <a:ln>
+            <a:tailEnd type="triangle"/>
+          </a:ln>
+        </p:spPr>
+        <p:style>
+          <a:lnRef idx="1">
+            <a:schemeClr val="accent1"/>
+          </a:lnRef>
+          <a:fillRef idx="0">
+            <a:schemeClr val="accent1"/>
+          </a:fillRef>
+          <a:effectRef idx="0">
+            <a:schemeClr val="accent1"/>
+          </a:effectRef>
+          <a:fontRef idx="minor">
+            <a:schemeClr val="tx1"/>
+          </a:fontRef>
+        </p:style>
+      </p:cxnSp>
+    </p:spTree>
+    <p:extLst>
+      <p:ext uri="{BB962C8B-B14F-4D97-AF65-F5344CB8AC3E}">
+        <p14:creationId xmlns:p14="http://schemas.microsoft.com/office/powerpoint/2010/main" val="2964365872"/>
+      </p:ext>
+    </p:extLst>
+  </p:cSld>
+  <p:clrMapOvr>
+    <a:masterClrMapping/>
+  </p:clrMapOvr>
+</p:sld>
+</file>
+
+<file path=ppt/slides/slide13.xml><?xml version="1.0" encoding="utf-8"?>
+<p:sld xmlns:a="http://schemas.openxmlformats.org/drawingml/2006/main" xmlns:r="http://schemas.openxmlformats.org/officeDocument/2006/relationships" xmlns:p="http://schemas.openxmlformats.org/presentationml/2006/main">
+  <p:cSld>
+    <p:spTree>
+      <p:nvGrpSpPr>
+        <p:cNvPr id="1" name=""/>
+        <p:cNvGrpSpPr/>
+        <p:nvPr/>
+      </p:nvGrpSpPr>
+      <p:grpSpPr>
+        <a:xfrm>
+          <a:off x="0" y="0"/>
+          <a:ext cx="0" cy="0"/>
+          <a:chOff x="0" y="0"/>
+          <a:chExt cx="0" cy="0"/>
+        </a:xfrm>
+      </p:grpSpPr>
+      <p:sp>
+        <p:nvSpPr>
+          <p:cNvPr id="2" name="Title 1">
+            <a:extLst>
+              <a:ext uri="{FF2B5EF4-FFF2-40B4-BE49-F238E27FC236}">
+                <a16:creationId xmlns:a16="http://schemas.microsoft.com/office/drawing/2014/main" id="{BE2CFFEB-FCF5-9DF9-524C-E45FFB3EDDDD}"/>
+              </a:ext>
+            </a:extLst>
+          </p:cNvPr>
+          <p:cNvSpPr>
+            <a:spLocks noGrp="1"/>
+          </p:cNvSpPr>
+          <p:nvPr>
+            <p:ph type="title"/>
+          </p:nvPr>
+        </p:nvSpPr>
+        <p:spPr/>
+        <p:txBody>
+          <a:bodyPr/>
+          <a:lstStyle/>
+          <a:p>
+            <a:r>
+              <a:rPr lang="en-US" dirty="0"/>
+              <a:t>Conversions in Expressions</a:t>
+            </a:r>
+          </a:p>
+        </p:txBody>
+      </p:sp>
+      <p:sp>
+        <p:nvSpPr>
+          <p:cNvPr id="3" name="Content Placeholder 2">
+            <a:extLst>
+              <a:ext uri="{FF2B5EF4-FFF2-40B4-BE49-F238E27FC236}">
+                <a16:creationId xmlns:a16="http://schemas.microsoft.com/office/drawing/2014/main" id="{6C5FD1E5-6F06-1A59-7A64-F25538F70C0B}"/>
+              </a:ext>
+            </a:extLst>
+          </p:cNvPr>
+          <p:cNvSpPr>
+            <a:spLocks noGrp="1"/>
+          </p:cNvSpPr>
+          <p:nvPr>
+            <p:ph idx="1"/>
+          </p:nvPr>
+        </p:nvSpPr>
+        <p:spPr/>
+        <p:txBody>
+          <a:bodyPr/>
+          <a:lstStyle/>
+          <a:p>
+            <a:r>
+              <a:rPr lang="en-US" i="1" dirty="0"/>
+              <a:t>When types are mixed, the narrow type is promoted to the wider type</a:t>
+            </a:r>
+          </a:p>
+          <a:p>
+            <a:pPr lvl="1"/>
+            <a:r>
+              <a:rPr lang="en-US" dirty="0"/>
+              <a:t>The full rules are more complicated, but the statement above is the idea</a:t>
+            </a:r>
+          </a:p>
+        </p:txBody>
+      </p:sp>
+      <p:sp>
+        <p:nvSpPr>
+          <p:cNvPr id="4" name="TextBox 3">
+            <a:extLst>
+              <a:ext uri="{FF2B5EF4-FFF2-40B4-BE49-F238E27FC236}">
+                <a16:creationId xmlns:a16="http://schemas.microsoft.com/office/drawing/2014/main" id="{38D86A53-0736-5867-F442-32D560AFB464}"/>
+              </a:ext>
+            </a:extLst>
+          </p:cNvPr>
+          <p:cNvSpPr txBox="1"/>
+          <p:nvPr/>
+        </p:nvSpPr>
+        <p:spPr>
+          <a:xfrm>
+            <a:off x="838200" y="2841171"/>
+            <a:ext cx="11455380" cy="3139321"/>
+          </a:xfrm>
+          <a:prstGeom prst="rect">
+            <a:avLst/>
+          </a:prstGeom>
+          <a:noFill/>
+        </p:spPr>
+        <p:txBody>
+          <a:bodyPr wrap="none" rtlCol="0">
+            <a:spAutoFit/>
+          </a:bodyPr>
+          <a:lstStyle/>
+          <a:p>
+            <a:r>
+              <a:rPr lang="en-US" b="1" dirty="0">
+                <a:latin typeface="Consolas" panose="020B0609020204030204" pitchFamily="49" charset="0"/>
+                <a:cs typeface="Consolas" panose="020B0609020204030204" pitchFamily="49" charset="0"/>
+              </a:rPr>
+              <a:t>int</a:t>
+            </a:r>
+            <a:r>
+              <a:rPr lang="en-US" dirty="0">
+                <a:latin typeface="Consolas" panose="020B0609020204030204" pitchFamily="49" charset="0"/>
+                <a:cs typeface="Consolas" panose="020B0609020204030204" pitchFamily="49" charset="0"/>
+              </a:rPr>
+              <a:t> x = 42;</a:t>
+            </a:r>
+          </a:p>
+          <a:p>
+            <a:r>
+              <a:rPr lang="en-US" b="1" dirty="0">
+                <a:latin typeface="Consolas" panose="020B0609020204030204" pitchFamily="49" charset="0"/>
+                <a:cs typeface="Consolas" panose="020B0609020204030204" pitchFamily="49" charset="0"/>
+              </a:rPr>
+              <a:t>long</a:t>
+            </a:r>
+            <a:r>
+              <a:rPr lang="en-US" dirty="0">
+                <a:latin typeface="Consolas" panose="020B0609020204030204" pitchFamily="49" charset="0"/>
+                <a:cs typeface="Consolas" panose="020B0609020204030204" pitchFamily="49" charset="0"/>
+              </a:rPr>
+              <a:t> y = 84;</a:t>
+            </a:r>
+          </a:p>
+          <a:p>
+            <a:r>
+              <a:rPr lang="en-US" b="1" dirty="0">
+                <a:latin typeface="Consolas" panose="020B0609020204030204" pitchFamily="49" charset="0"/>
+                <a:cs typeface="Consolas" panose="020B0609020204030204" pitchFamily="49" charset="0"/>
+              </a:rPr>
+              <a:t>double</a:t>
+            </a:r>
+            <a:r>
+              <a:rPr lang="en-US" dirty="0">
+                <a:latin typeface="Consolas" panose="020B0609020204030204" pitchFamily="49" charset="0"/>
+                <a:cs typeface="Consolas" panose="020B0609020204030204" pitchFamily="49" charset="0"/>
+              </a:rPr>
+              <a:t> z = 3.14159;</a:t>
+            </a:r>
+          </a:p>
+          <a:p>
+            <a:endParaRPr lang="en-US" dirty="0">
+              <a:latin typeface="Consolas" panose="020B0609020204030204" pitchFamily="49" charset="0"/>
+              <a:cs typeface="Consolas" panose="020B0609020204030204" pitchFamily="49" charset="0"/>
+            </a:endParaRPr>
+          </a:p>
+          <a:p>
+            <a:r>
+              <a:rPr lang="en-US" dirty="0">
+                <a:latin typeface="Consolas" panose="020B0609020204030204" pitchFamily="49" charset="0"/>
+                <a:cs typeface="Consolas" panose="020B0609020204030204" pitchFamily="49" charset="0"/>
+              </a:rPr>
+              <a:t>x = x + y;</a:t>
+            </a:r>
+          </a:p>
+          <a:p>
+            <a:r>
+              <a:rPr lang="en-US" dirty="0">
+                <a:latin typeface="Consolas" panose="020B0609020204030204" pitchFamily="49" charset="0"/>
+                <a:cs typeface="Consolas" panose="020B0609020204030204" pitchFamily="49" charset="0"/>
+              </a:rPr>
+              <a:t>  // x is promoted to long, the addition is done as long.</a:t>
+            </a:r>
+          </a:p>
+          <a:p>
+            <a:r>
+              <a:rPr lang="en-US" dirty="0">
+                <a:latin typeface="Consolas" panose="020B0609020204030204" pitchFamily="49" charset="0"/>
+                <a:cs typeface="Consolas" panose="020B0609020204030204" pitchFamily="49" charset="0"/>
+              </a:rPr>
+              <a:t>  // The resulting long is converted (with possible loss) back to int for the assignment.</a:t>
+            </a:r>
+          </a:p>
+          <a:p>
+            <a:endParaRPr lang="en-US" dirty="0">
+              <a:latin typeface="Consolas" panose="020B0609020204030204" pitchFamily="49" charset="0"/>
+              <a:cs typeface="Consolas" panose="020B0609020204030204" pitchFamily="49" charset="0"/>
+            </a:endParaRPr>
+          </a:p>
+          <a:p>
+            <a:r>
+              <a:rPr lang="en-US" dirty="0">
+                <a:latin typeface="Consolas" panose="020B0609020204030204" pitchFamily="49" charset="0"/>
+                <a:cs typeface="Consolas" panose="020B0609020204030204" pitchFamily="49" charset="0"/>
+              </a:rPr>
+              <a:t>z = x + y;</a:t>
+            </a:r>
+          </a:p>
+          <a:p>
+            <a:r>
+              <a:rPr lang="en-US" dirty="0">
+                <a:latin typeface="Consolas" panose="020B0609020204030204" pitchFamily="49" charset="0"/>
+                <a:cs typeface="Consolas" panose="020B0609020204030204" pitchFamily="49" charset="0"/>
+              </a:rPr>
+              <a:t>  // x is promoted to long, the addition is done as long.</a:t>
+            </a:r>
+          </a:p>
+          <a:p>
+            <a:r>
+              <a:rPr lang="en-US" dirty="0">
+                <a:latin typeface="Consolas" panose="020B0609020204030204" pitchFamily="49" charset="0"/>
+                <a:cs typeface="Consolas" panose="020B0609020204030204" pitchFamily="49" charset="0"/>
+              </a:rPr>
+              <a:t>  // The resulting long is converted to double for the assignment.</a:t>
+            </a:r>
+          </a:p>
+        </p:txBody>
+      </p:sp>
+    </p:spTree>
+    <p:extLst>
+      <p:ext uri="{BB962C8B-B14F-4D97-AF65-F5344CB8AC3E}">
+        <p14:creationId xmlns:p14="http://schemas.microsoft.com/office/powerpoint/2010/main" val="1462706401"/>
+      </p:ext>
+    </p:extLst>
+  </p:cSld>
+  <p:clrMapOvr>
+    <a:masterClrMapping/>
+  </p:clrMapOvr>
+</p:sld>
+</file>
+
+<file path=ppt/slides/slide14.xml><?xml version="1.0" encoding="utf-8"?>
+<p:sld xmlns:a="http://schemas.openxmlformats.org/drawingml/2006/main" xmlns:r="http://schemas.openxmlformats.org/officeDocument/2006/relationships" xmlns:p="http://schemas.openxmlformats.org/presentationml/2006/main">
+  <p:cSld>
+    <p:spTree>
+      <p:nvGrpSpPr>
+        <p:cNvPr id="1" name=""/>
+        <p:cNvGrpSpPr/>
+        <p:nvPr/>
+      </p:nvGrpSpPr>
+      <p:grpSpPr>
+        <a:xfrm>
+          <a:off x="0" y="0"/>
+          <a:ext cx="0" cy="0"/>
+          <a:chOff x="0" y="0"/>
+          <a:chExt cx="0" cy="0"/>
+        </a:xfrm>
+      </p:grpSpPr>
+      <p:sp>
+        <p:nvSpPr>
+          <p:cNvPr id="2" name="Title 1">
+            <a:extLst>
+              <a:ext uri="{FF2B5EF4-FFF2-40B4-BE49-F238E27FC236}">
+                <a16:creationId xmlns:a16="http://schemas.microsoft.com/office/drawing/2014/main" id="{E664AF3B-8DB5-1A00-025C-AEFAD1453D9B}"/>
+              </a:ext>
+            </a:extLst>
+          </p:cNvPr>
+          <p:cNvSpPr>
+            <a:spLocks noGrp="1"/>
+          </p:cNvSpPr>
+          <p:nvPr>
+            <p:ph type="title"/>
+          </p:nvPr>
+        </p:nvSpPr>
+        <p:spPr/>
+        <p:txBody>
+          <a:bodyPr/>
+          <a:lstStyle/>
+          <a:p>
+            <a:r>
+              <a:rPr lang="en-US" dirty="0"/>
+              <a:t>Signed/Unsigned Conversions</a:t>
+            </a:r>
+          </a:p>
+        </p:txBody>
+      </p:sp>
+      <p:sp>
+        <p:nvSpPr>
+          <p:cNvPr id="3" name="Content Placeholder 2">
+            <a:extLst>
+              <a:ext uri="{FF2B5EF4-FFF2-40B4-BE49-F238E27FC236}">
+                <a16:creationId xmlns:a16="http://schemas.microsoft.com/office/drawing/2014/main" id="{A48F673F-7F18-63CA-E2CA-65197A379CDB}"/>
+              </a:ext>
+            </a:extLst>
+          </p:cNvPr>
+          <p:cNvSpPr>
+            <a:spLocks noGrp="1"/>
+          </p:cNvSpPr>
+          <p:nvPr>
+            <p:ph idx="1"/>
+          </p:nvPr>
+        </p:nvSpPr>
+        <p:spPr/>
+        <p:txBody>
+          <a:bodyPr/>
+          <a:lstStyle/>
+          <a:p>
+            <a:r>
+              <a:rPr lang="en-US" dirty="0"/>
+              <a:t>Consider int and unsigned int…</a:t>
+            </a:r>
+          </a:p>
+          <a:p>
+            <a:pPr lvl="1"/>
+            <a:r>
+              <a:rPr lang="en-US" dirty="0"/>
+              <a:t>The standard requires they have the same number of bits</a:t>
+            </a:r>
+          </a:p>
+          <a:p>
+            <a:pPr lvl="1"/>
+            <a:r>
+              <a:rPr lang="en-US" dirty="0"/>
+              <a:t>BUT… they have overlapping ranges</a:t>
+            </a:r>
+          </a:p>
+          <a:p>
+            <a:pPr lvl="1"/>
+            <a:r>
+              <a:rPr lang="en-US" u="sng" dirty="0"/>
+              <a:t>Conversion in either direction is unsafe</a:t>
+            </a:r>
+          </a:p>
+          <a:p>
+            <a:pPr lvl="1"/>
+            <a:r>
+              <a:rPr lang="en-US" i="1" dirty="0"/>
+              <a:t>Avoid mixing signed and unsigned types</a:t>
+            </a:r>
+            <a:r>
+              <a:rPr lang="en-US" dirty="0"/>
+              <a:t>!</a:t>
+            </a:r>
+          </a:p>
+          <a:p>
+            <a:pPr lvl="1"/>
+            <a:r>
+              <a:rPr lang="en-US" dirty="0"/>
+              <a:t>Fix any compiler warnings that arise from doing so</a:t>
+            </a:r>
+          </a:p>
+          <a:p>
+            <a:pPr lvl="2"/>
+            <a:r>
+              <a:rPr lang="en-US" dirty="0"/>
+              <a:t>Many bugs arise from such mixing</a:t>
+            </a:r>
+          </a:p>
+        </p:txBody>
+      </p:sp>
+    </p:spTree>
+    <p:extLst>
+      <p:ext uri="{BB962C8B-B14F-4D97-AF65-F5344CB8AC3E}">
+        <p14:creationId xmlns:p14="http://schemas.microsoft.com/office/powerpoint/2010/main" val="2766257429"/>
+      </p:ext>
+    </p:extLst>
+  </p:cSld>
+  <p:clrMapOvr>
+    <a:masterClrMapping/>
+  </p:clrMapOvr>
+</p:sld>
+</file>
+
+<file path=ppt/slides/slide15.xml><?xml version="1.0" encoding="utf-8"?>
+<p:sld xmlns:a="http://schemas.openxmlformats.org/drawingml/2006/main" xmlns:r="http://schemas.openxmlformats.org/officeDocument/2006/relationships" xmlns:p="http://schemas.openxmlformats.org/presentationml/2006/main">
+  <p:cSld>
+    <p:spTree>
+      <p:nvGrpSpPr>
+        <p:cNvPr id="1" name=""/>
+        <p:cNvGrpSpPr/>
+        <p:nvPr/>
+      </p:nvGrpSpPr>
+      <p:grpSpPr>
+        <a:xfrm>
+          <a:off x="0" y="0"/>
+          <a:ext cx="0" cy="0"/>
+          <a:chOff x="0" y="0"/>
+          <a:chExt cx="0" cy="0"/>
+        </a:xfrm>
+      </p:grpSpPr>
+      <p:sp>
+        <p:nvSpPr>
+          <p:cNvPr id="2" name="Title 1">
+            <a:extLst>
+              <a:ext uri="{FF2B5EF4-FFF2-40B4-BE49-F238E27FC236}">
+                <a16:creationId xmlns:a16="http://schemas.microsoft.com/office/drawing/2014/main" id="{56794033-6202-50C2-2D4C-60AB85092506}"/>
+              </a:ext>
+            </a:extLst>
+          </p:cNvPr>
+          <p:cNvSpPr>
+            <a:spLocks noGrp="1"/>
+          </p:cNvSpPr>
+          <p:nvPr>
+            <p:ph type="title"/>
+          </p:nvPr>
+        </p:nvSpPr>
+        <p:spPr/>
+        <p:txBody>
+          <a:bodyPr/>
+          <a:lstStyle/>
+          <a:p>
+            <a:r>
+              <a:rPr lang="en-US" dirty="0"/>
+              <a:t>The type alias </a:t>
+            </a:r>
+            <a:r>
+              <a:rPr lang="en-US" dirty="0" err="1">
+                <a:latin typeface="Consolas" panose="020B0609020204030204" pitchFamily="49" charset="0"/>
+                <a:cs typeface="Consolas" panose="020B0609020204030204" pitchFamily="49" charset="0"/>
+              </a:rPr>
+              <a:t>size_t</a:t>
+            </a:r>
+            <a:endParaRPr lang="en-US" dirty="0">
+              <a:latin typeface="Consolas" panose="020B0609020204030204" pitchFamily="49" charset="0"/>
+              <a:cs typeface="Consolas" panose="020B0609020204030204" pitchFamily="49" charset="0"/>
+            </a:endParaRPr>
+          </a:p>
+        </p:txBody>
+      </p:sp>
+      <p:sp>
+        <p:nvSpPr>
+          <p:cNvPr id="3" name="Content Placeholder 2">
+            <a:extLst>
+              <a:ext uri="{FF2B5EF4-FFF2-40B4-BE49-F238E27FC236}">
+                <a16:creationId xmlns:a16="http://schemas.microsoft.com/office/drawing/2014/main" id="{9D999F21-CB92-2089-2D94-F3D3A08CE32F}"/>
+              </a:ext>
+            </a:extLst>
+          </p:cNvPr>
+          <p:cNvSpPr>
+            <a:spLocks noGrp="1"/>
+          </p:cNvSpPr>
+          <p:nvPr>
+            <p:ph idx="1"/>
+          </p:nvPr>
+        </p:nvSpPr>
+        <p:spPr/>
+        <p:txBody>
+          <a:bodyPr/>
+          <a:lstStyle/>
+          <a:p>
+            <a:r>
+              <a:rPr lang="en-US" dirty="0"/>
+              <a:t>C (and C++) define a type alias in various headers: </a:t>
+            </a:r>
+            <a:r>
+              <a:rPr lang="en-US" dirty="0" err="1">
+                <a:latin typeface="Consolas" panose="020B0609020204030204" pitchFamily="49" charset="0"/>
+                <a:cs typeface="Consolas" panose="020B0609020204030204" pitchFamily="49" charset="0"/>
+              </a:rPr>
+              <a:t>size_t</a:t>
+            </a:r>
+            <a:endParaRPr lang="en-US" dirty="0">
+              <a:latin typeface="Consolas" panose="020B0609020204030204" pitchFamily="49" charset="0"/>
+              <a:cs typeface="Consolas" panose="020B0609020204030204" pitchFamily="49" charset="0"/>
+            </a:endParaRPr>
+          </a:p>
+          <a:p>
+            <a:pPr lvl="1"/>
+            <a:r>
+              <a:rPr lang="en-US" dirty="0"/>
+              <a:t>It is an </a:t>
+            </a:r>
+            <a:r>
+              <a:rPr lang="en-US" u="sng" dirty="0"/>
+              <a:t>unsigned integral type</a:t>
+            </a:r>
+            <a:r>
+              <a:rPr lang="en-US" dirty="0"/>
+              <a:t> suitable for measuring the size of objects in memory</a:t>
+            </a:r>
+          </a:p>
+          <a:p>
+            <a:pPr lvl="1"/>
+            <a:r>
+              <a:rPr lang="en-US" dirty="0"/>
+              <a:t>On 64-bit systems it is usually </a:t>
+            </a:r>
+            <a:r>
+              <a:rPr lang="en-US" dirty="0">
+                <a:latin typeface="Consolas" panose="020B0609020204030204" pitchFamily="49" charset="0"/>
+                <a:cs typeface="Consolas" panose="020B0609020204030204" pitchFamily="49" charset="0"/>
+              </a:rPr>
+              <a:t>unsigned long</a:t>
+            </a:r>
+            <a:r>
+              <a:rPr lang="en-US" dirty="0"/>
+              <a:t>. On 16-bit systems it is usually </a:t>
+            </a:r>
+            <a:r>
+              <a:rPr lang="en-US" dirty="0">
+                <a:latin typeface="Consolas" panose="020B0609020204030204" pitchFamily="49" charset="0"/>
+                <a:cs typeface="Consolas" panose="020B0609020204030204" pitchFamily="49" charset="0"/>
+              </a:rPr>
+              <a:t>unsigned int</a:t>
+            </a:r>
+            <a:r>
+              <a:rPr lang="en-US" dirty="0"/>
+              <a:t>. </a:t>
+            </a:r>
+            <a:r>
+              <a:rPr lang="en-US" i="1" dirty="0"/>
+              <a:t>You should always use </a:t>
+            </a:r>
+            <a:r>
+              <a:rPr lang="en-US" i="1" dirty="0" err="1">
+                <a:latin typeface="Consolas" panose="020B0609020204030204" pitchFamily="49" charset="0"/>
+                <a:cs typeface="Consolas" panose="020B0609020204030204" pitchFamily="49" charset="0"/>
+              </a:rPr>
+              <a:t>size_t</a:t>
+            </a:r>
+            <a:r>
+              <a:rPr lang="en-US" i="1" dirty="0"/>
+              <a:t> where it is appropriate</a:t>
+            </a:r>
+            <a:r>
+              <a:rPr lang="en-US" dirty="0"/>
+              <a:t> (for portability, don’t try to use the underlying type directly)</a:t>
+            </a:r>
+          </a:p>
+        </p:txBody>
+      </p:sp>
+      <p:sp>
+        <p:nvSpPr>
+          <p:cNvPr id="4" name="TextBox 3">
+            <a:extLst>
+              <a:ext uri="{FF2B5EF4-FFF2-40B4-BE49-F238E27FC236}">
+                <a16:creationId xmlns:a16="http://schemas.microsoft.com/office/drawing/2014/main" id="{85DD3293-7CC2-590A-1DB0-6B44BD6CA695}"/>
+              </a:ext>
+            </a:extLst>
+          </p:cNvPr>
+          <p:cNvSpPr txBox="1"/>
+          <p:nvPr/>
+        </p:nvSpPr>
+        <p:spPr>
+          <a:xfrm>
+            <a:off x="2141231" y="4147458"/>
+            <a:ext cx="7909538" cy="923330"/>
+          </a:xfrm>
+          <a:prstGeom prst="rect">
+            <a:avLst/>
+          </a:prstGeom>
+          <a:noFill/>
+        </p:spPr>
+        <p:txBody>
+          <a:bodyPr wrap="none" rtlCol="0">
+            <a:spAutoFit/>
+          </a:bodyPr>
+          <a:lstStyle/>
+          <a:p>
+            <a:r>
+              <a:rPr lang="en-US" dirty="0">
+                <a:latin typeface="Consolas" panose="020B0609020204030204" pitchFamily="49" charset="0"/>
+                <a:cs typeface="Consolas" panose="020B0609020204030204" pitchFamily="49" charset="0"/>
+              </a:rPr>
+              <a:t>#include &lt;</a:t>
+            </a:r>
+            <a:r>
+              <a:rPr lang="en-US" dirty="0" err="1">
+                <a:latin typeface="Consolas" panose="020B0609020204030204" pitchFamily="49" charset="0"/>
+                <a:cs typeface="Consolas" panose="020B0609020204030204" pitchFamily="49" charset="0"/>
+              </a:rPr>
+              <a:t>cstring</a:t>
+            </a:r>
+            <a:r>
+              <a:rPr lang="en-US" dirty="0">
+                <a:latin typeface="Consolas" panose="020B0609020204030204" pitchFamily="49" charset="0"/>
+                <a:cs typeface="Consolas" panose="020B0609020204030204" pitchFamily="49" charset="0"/>
+              </a:rPr>
+              <a:t>&gt;  // C++’s version of C’s header &lt;</a:t>
+            </a:r>
+            <a:r>
+              <a:rPr lang="en-US" dirty="0" err="1">
+                <a:latin typeface="Consolas" panose="020B0609020204030204" pitchFamily="49" charset="0"/>
+                <a:cs typeface="Consolas" panose="020B0609020204030204" pitchFamily="49" charset="0"/>
+              </a:rPr>
+              <a:t>string.h</a:t>
+            </a:r>
+            <a:r>
+              <a:rPr lang="en-US" dirty="0">
+                <a:latin typeface="Consolas" panose="020B0609020204030204" pitchFamily="49" charset="0"/>
+                <a:cs typeface="Consolas" panose="020B0609020204030204" pitchFamily="49" charset="0"/>
+              </a:rPr>
+              <a:t>&gt;</a:t>
+            </a:r>
+          </a:p>
+          <a:p>
+            <a:endParaRPr lang="en-US" dirty="0">
+              <a:latin typeface="Consolas" panose="020B0609020204030204" pitchFamily="49" charset="0"/>
+              <a:cs typeface="Consolas" panose="020B0609020204030204" pitchFamily="49" charset="0"/>
+            </a:endParaRPr>
+          </a:p>
+          <a:p>
+            <a:r>
+              <a:rPr lang="en-US" dirty="0">
+                <a:latin typeface="Consolas" panose="020B0609020204030204" pitchFamily="49" charset="0"/>
+                <a:cs typeface="Consolas" panose="020B0609020204030204" pitchFamily="49" charset="0"/>
+              </a:rPr>
+              <a:t>int length = std::</a:t>
+            </a:r>
+            <a:r>
+              <a:rPr lang="en-US" dirty="0" err="1">
+                <a:latin typeface="Consolas" panose="020B0609020204030204" pitchFamily="49" charset="0"/>
+                <a:cs typeface="Consolas" panose="020B0609020204030204" pitchFamily="49" charset="0"/>
+              </a:rPr>
+              <a:t>strlen</a:t>
+            </a:r>
+            <a:r>
+              <a:rPr lang="en-US" dirty="0">
+                <a:latin typeface="Consolas" panose="020B0609020204030204" pitchFamily="49" charset="0"/>
+                <a:cs typeface="Consolas" panose="020B0609020204030204" pitchFamily="49" charset="0"/>
+              </a:rPr>
+              <a:t>( s );</a:t>
+            </a:r>
+          </a:p>
+        </p:txBody>
+      </p:sp>
+      <p:sp>
+        <p:nvSpPr>
+          <p:cNvPr id="5" name="TextBox 4">
+            <a:extLst>
+              <a:ext uri="{FF2B5EF4-FFF2-40B4-BE49-F238E27FC236}">
+                <a16:creationId xmlns:a16="http://schemas.microsoft.com/office/drawing/2014/main" id="{DB8539BA-73E1-2BFC-5D7B-1E653FE5E0B0}"/>
+              </a:ext>
+            </a:extLst>
+          </p:cNvPr>
+          <p:cNvSpPr txBox="1"/>
+          <p:nvPr/>
+        </p:nvSpPr>
+        <p:spPr>
+          <a:xfrm>
+            <a:off x="4561114" y="5205725"/>
+            <a:ext cx="6259406" cy="923330"/>
+          </a:xfrm>
+          <a:prstGeom prst="rect">
+            <a:avLst/>
+          </a:prstGeom>
+          <a:noFill/>
+        </p:spPr>
+        <p:txBody>
+          <a:bodyPr wrap="none" rtlCol="0">
+            <a:spAutoFit/>
+          </a:bodyPr>
+          <a:lstStyle/>
+          <a:p>
+            <a:r>
+              <a:rPr lang="en-US" dirty="0"/>
+              <a:t>Warning: Mixing signed and unsigned types!</a:t>
+            </a:r>
+          </a:p>
+          <a:p>
+            <a:r>
+              <a:rPr lang="en-US" dirty="0"/>
+              <a:t>Warning: Possible loss of precision (64-bit </a:t>
+            </a:r>
+            <a:r>
+              <a:rPr lang="en-US" dirty="0" err="1">
+                <a:latin typeface="Consolas" panose="020B0609020204030204" pitchFamily="49" charset="0"/>
+                <a:cs typeface="Consolas" panose="020B0609020204030204" pitchFamily="49" charset="0"/>
+              </a:rPr>
+              <a:t>size_t</a:t>
+            </a:r>
+            <a:r>
+              <a:rPr lang="en-US" dirty="0"/>
+              <a:t> vs 32-bit </a:t>
+            </a:r>
+            <a:r>
+              <a:rPr lang="en-US" dirty="0">
+                <a:latin typeface="Consolas" panose="020B0609020204030204" pitchFamily="49" charset="0"/>
+                <a:cs typeface="Consolas" panose="020B0609020204030204" pitchFamily="49" charset="0"/>
+              </a:rPr>
+              <a:t>int</a:t>
+            </a:r>
+            <a:r>
+              <a:rPr lang="en-US" dirty="0"/>
+              <a:t>)</a:t>
+            </a:r>
+          </a:p>
+          <a:p>
+            <a:r>
+              <a:rPr lang="en-US" i="1" u="sng" dirty="0"/>
+              <a:t>Fix warnings like these!</a:t>
+            </a:r>
+          </a:p>
+        </p:txBody>
+      </p:sp>
+      <p:cxnSp>
+        <p:nvCxnSpPr>
+          <p:cNvPr id="7" name="Straight Arrow Connector 6">
+            <a:extLst>
+              <a:ext uri="{FF2B5EF4-FFF2-40B4-BE49-F238E27FC236}">
+                <a16:creationId xmlns:a16="http://schemas.microsoft.com/office/drawing/2014/main" id="{C592D654-A790-32FA-681F-4C2FCFA6D605}"/>
+              </a:ext>
+            </a:extLst>
+          </p:cNvPr>
+          <p:cNvCxnSpPr/>
+          <p:nvPr/>
+        </p:nvCxnSpPr>
+        <p:spPr>
+          <a:xfrm flipH="1" flipV="1">
+            <a:off x="3799114" y="5070788"/>
+            <a:ext cx="762000" cy="596602"/>
+          </a:xfrm>
+          <a:prstGeom prst="straightConnector1">
+            <a:avLst/>
+          </a:prstGeom>
+          <a:ln>
+            <a:tailEnd type="triangle"/>
+          </a:ln>
+        </p:spPr>
+        <p:style>
+          <a:lnRef idx="1">
+            <a:schemeClr val="accent1"/>
+          </a:lnRef>
+          <a:fillRef idx="0">
+            <a:schemeClr val="accent1"/>
+          </a:fillRef>
+          <a:effectRef idx="0">
+            <a:schemeClr val="accent1"/>
+          </a:effectRef>
+          <a:fontRef idx="minor">
+            <a:schemeClr val="tx1"/>
+          </a:fontRef>
+        </p:style>
+      </p:cxnSp>
+    </p:spTree>
+    <p:extLst>
+      <p:ext uri="{BB962C8B-B14F-4D97-AF65-F5344CB8AC3E}">
+        <p14:creationId xmlns:p14="http://schemas.microsoft.com/office/powerpoint/2010/main" val="2580635786"/>
+      </p:ext>
+    </p:extLst>
+  </p:cSld>
+  <p:clrMapOvr>
+    <a:masterClrMapping/>
+  </p:clrMapOvr>
+</p:sld>
+</file>
+
+<file path=ppt/slides/slide16.xml><?xml version="1.0" encoding="utf-8"?>
+<p:sld xmlns:a="http://schemas.openxmlformats.org/drawingml/2006/main" xmlns:r="http://schemas.openxmlformats.org/officeDocument/2006/relationships" xmlns:p="http://schemas.openxmlformats.org/presentationml/2006/main">
+  <p:cSld>
+    <p:spTree>
+      <p:nvGrpSpPr>
+        <p:cNvPr id="1" name=""/>
+        <p:cNvGrpSpPr/>
+        <p:nvPr/>
+      </p:nvGrpSpPr>
+      <p:grpSpPr>
+        <a:xfrm>
+          <a:off x="0" y="0"/>
+          <a:ext cx="0" cy="0"/>
+          <a:chOff x="0" y="0"/>
+          <a:chExt cx="0" cy="0"/>
+        </a:xfrm>
+      </p:grpSpPr>
+      <p:sp>
+        <p:nvSpPr>
+          <p:cNvPr id="2" name="Title 1">
+            <a:extLst>
+              <a:ext uri="{FF2B5EF4-FFF2-40B4-BE49-F238E27FC236}">
+                <a16:creationId xmlns:a16="http://schemas.microsoft.com/office/drawing/2014/main" id="{92D2C0FB-AB09-9402-BC99-C93EC02C6BA0}"/>
+              </a:ext>
+            </a:extLst>
+          </p:cNvPr>
+          <p:cNvSpPr>
+            <a:spLocks noGrp="1"/>
+          </p:cNvSpPr>
+          <p:nvPr>
+            <p:ph type="title"/>
+          </p:nvPr>
+        </p:nvSpPr>
+        <p:spPr/>
+        <p:txBody>
+          <a:bodyPr/>
+          <a:lstStyle/>
+          <a:p>
+            <a:r>
+              <a:rPr lang="en-US" dirty="0"/>
+              <a:t>Why?</a:t>
+            </a:r>
+          </a:p>
+        </p:txBody>
+      </p:sp>
+      <p:sp>
+        <p:nvSpPr>
+          <p:cNvPr id="3" name="Content Placeholder 2">
+            <a:extLst>
+              <a:ext uri="{FF2B5EF4-FFF2-40B4-BE49-F238E27FC236}">
+                <a16:creationId xmlns:a16="http://schemas.microsoft.com/office/drawing/2014/main" id="{06877385-777B-4D0A-165F-39ACEDDAB5FD}"/>
+              </a:ext>
+            </a:extLst>
+          </p:cNvPr>
+          <p:cNvSpPr>
+            <a:spLocks noGrp="1"/>
+          </p:cNvSpPr>
+          <p:nvPr>
+            <p:ph idx="1"/>
+          </p:nvPr>
+        </p:nvSpPr>
+        <p:spPr/>
+        <p:txBody>
+          <a:bodyPr/>
+          <a:lstStyle/>
+          <a:p>
+            <a:r>
+              <a:rPr lang="en-US" dirty="0"/>
+              <a:t>Why does C allow unsafe implicit conversions?</a:t>
+            </a:r>
+          </a:p>
+          <a:p>
+            <a:pPr lvl="1"/>
+            <a:r>
+              <a:rPr lang="en-US" dirty="0"/>
+              <a:t>C++ does it for C compatibility… except when the uniform initialization syntax is used… C compatibility isn’t an issue in that situation.</a:t>
+            </a:r>
+          </a:p>
+          <a:p>
+            <a:r>
+              <a:rPr lang="en-US" dirty="0"/>
+              <a:t>Good question!</a:t>
+            </a:r>
+          </a:p>
+          <a:p>
+            <a:pPr lvl="1"/>
+            <a:r>
+              <a:rPr lang="en-US" dirty="0"/>
+              <a:t>Probably a “mistake” in the design of C.</a:t>
+            </a:r>
+          </a:p>
+          <a:p>
+            <a:pPr lvl="1"/>
+            <a:r>
+              <a:rPr lang="en-US" dirty="0"/>
+              <a:t>Many, many bugs and security problems arise because of this. The language should never have allowed it.</a:t>
+            </a:r>
+          </a:p>
+          <a:p>
+            <a:pPr lvl="1"/>
+            <a:r>
+              <a:rPr lang="en-US" dirty="0"/>
+              <a:t>Modern C (and C++) compilers </a:t>
+            </a:r>
+            <a:r>
+              <a:rPr lang="en-US" u="sng" dirty="0"/>
+              <a:t>produce warnings</a:t>
+            </a:r>
+            <a:r>
+              <a:rPr lang="en-US" dirty="0"/>
+              <a:t> for most unsafe conversions… if you ask for them.</a:t>
+            </a:r>
+          </a:p>
+          <a:p>
+            <a:pPr lvl="1"/>
+            <a:r>
+              <a:rPr lang="en-US" i="1" dirty="0"/>
+              <a:t>Always use </a:t>
+            </a:r>
+            <a:r>
+              <a:rPr lang="en-US" i="1" dirty="0">
+                <a:latin typeface="Consolas" panose="020B0609020204030204" pitchFamily="49" charset="0"/>
+                <a:cs typeface="Consolas" panose="020B0609020204030204" pitchFamily="49" charset="0"/>
+              </a:rPr>
+              <a:t>–Wall</a:t>
+            </a:r>
+            <a:r>
+              <a:rPr lang="en-US" i="1" dirty="0"/>
+              <a:t> when compiling with g++! </a:t>
+            </a:r>
+            <a:r>
+              <a:rPr lang="en-US" i="1" u="sng" dirty="0"/>
+              <a:t>Treat warnings as errors!</a:t>
+            </a:r>
+          </a:p>
+        </p:txBody>
+      </p:sp>
+    </p:spTree>
+    <p:extLst>
+      <p:ext uri="{BB962C8B-B14F-4D97-AF65-F5344CB8AC3E}">
+        <p14:creationId xmlns:p14="http://schemas.microsoft.com/office/powerpoint/2010/main" val="2703835546"/>
+      </p:ext>
+    </p:extLst>
+  </p:cSld>
+  <p:clrMapOvr>
+    <a:masterClrMapping/>
+  </p:clrMapOvr>
+</p:sld>
+</file>
+
+<file path=ppt/slides/slide17.xml><?xml version="1.0" encoding="utf-8"?>
+<p:sld xmlns:a="http://schemas.openxmlformats.org/drawingml/2006/main" xmlns:r="http://schemas.openxmlformats.org/officeDocument/2006/relationships" xmlns:p="http://schemas.openxmlformats.org/presentationml/2006/main">
+  <p:cSld>
+    <p:spTree>
+      <p:nvGrpSpPr>
+        <p:cNvPr id="1" name=""/>
+        <p:cNvGrpSpPr/>
+        <p:nvPr/>
+      </p:nvGrpSpPr>
+      <p:grpSpPr>
+        <a:xfrm>
+          <a:off x="0" y="0"/>
+          <a:ext cx="0" cy="0"/>
+          <a:chOff x="0" y="0"/>
+          <a:chExt cx="0" cy="0"/>
+        </a:xfrm>
+      </p:grpSpPr>
+      <p:sp>
+        <p:nvSpPr>
+          <p:cNvPr id="2" name="Title 1">
+            <a:extLst>
+              <a:ext uri="{FF2B5EF4-FFF2-40B4-BE49-F238E27FC236}">
+                <a16:creationId xmlns:a16="http://schemas.microsoft.com/office/drawing/2014/main" id="{E60DD953-F8EA-8A98-9A63-8539A2AEA3FD}"/>
+              </a:ext>
+            </a:extLst>
+          </p:cNvPr>
+          <p:cNvSpPr>
+            <a:spLocks noGrp="1"/>
+          </p:cNvSpPr>
+          <p:nvPr>
+            <p:ph type="title"/>
+          </p:nvPr>
+        </p:nvSpPr>
+        <p:spPr/>
+        <p:txBody>
+          <a:bodyPr/>
+          <a:lstStyle/>
+          <a:p>
+            <a:r>
+              <a:rPr lang="en-US" dirty="0"/>
+              <a:t>User-Defined Conversions</a:t>
+            </a:r>
+          </a:p>
+        </p:txBody>
+      </p:sp>
+      <p:sp>
+        <p:nvSpPr>
+          <p:cNvPr id="3" name="Content Placeholder 2">
+            <a:extLst>
+              <a:ext uri="{FF2B5EF4-FFF2-40B4-BE49-F238E27FC236}">
+                <a16:creationId xmlns:a16="http://schemas.microsoft.com/office/drawing/2014/main" id="{03B4463C-2040-7329-B446-10BDDC80F120}"/>
+              </a:ext>
+            </a:extLst>
+          </p:cNvPr>
+          <p:cNvSpPr>
+            <a:spLocks noGrp="1"/>
+          </p:cNvSpPr>
+          <p:nvPr>
+            <p:ph idx="1"/>
+          </p:nvPr>
+        </p:nvSpPr>
+        <p:spPr/>
+        <p:txBody>
+          <a:bodyPr/>
+          <a:lstStyle/>
+          <a:p>
+            <a:r>
+              <a:rPr lang="en-US" dirty="0"/>
+              <a:t>If you don’t like implicit conversions, you will hate this…</a:t>
+            </a:r>
+          </a:p>
+          <a:p>
+            <a:r>
+              <a:rPr lang="en-US" dirty="0"/>
+              <a:t>C++ allows you to define implicit conversions for your classes</a:t>
+            </a:r>
+          </a:p>
+          <a:p>
+            <a:r>
+              <a:rPr lang="en-US" dirty="0"/>
+              <a:t>There are two directions:</a:t>
+            </a:r>
+          </a:p>
+          <a:p>
+            <a:pPr lvl="1"/>
+            <a:r>
+              <a:rPr lang="en-US" dirty="0"/>
+              <a:t>Implicitly converting something to your class type</a:t>
+            </a:r>
+          </a:p>
+          <a:p>
+            <a:pPr lvl="1"/>
+            <a:r>
+              <a:rPr lang="en-US" dirty="0"/>
+              <a:t>Implicitly converting an instance of your class to something else</a:t>
+            </a:r>
+          </a:p>
+          <a:p>
+            <a:r>
+              <a:rPr lang="en-US" dirty="0"/>
+              <a:t>The two directions are handled a little differently</a:t>
+            </a:r>
+          </a:p>
+        </p:txBody>
+      </p:sp>
+    </p:spTree>
+    <p:extLst>
+      <p:ext uri="{BB962C8B-B14F-4D97-AF65-F5344CB8AC3E}">
+        <p14:creationId xmlns:p14="http://schemas.microsoft.com/office/powerpoint/2010/main" val="3651769478"/>
+      </p:ext>
+    </p:extLst>
+  </p:cSld>
+  <p:clrMapOvr>
+    <a:masterClrMapping/>
+  </p:clrMapOvr>
+</p:sld>
+</file>
+
+<file path=ppt/slides/slide18.xml><?xml version="1.0" encoding="utf-8"?>
+<p:sld xmlns:a="http://schemas.openxmlformats.org/drawingml/2006/main" xmlns:r="http://schemas.openxmlformats.org/officeDocument/2006/relationships" xmlns:p="http://schemas.openxmlformats.org/presentationml/2006/main">
+  <p:cSld>
+    <p:spTree>
+      <p:nvGrpSpPr>
+        <p:cNvPr id="1" name=""/>
+        <p:cNvGrpSpPr/>
+        <p:nvPr/>
+      </p:nvGrpSpPr>
+      <p:grpSpPr>
+        <a:xfrm>
+          <a:off x="0" y="0"/>
+          <a:ext cx="0" cy="0"/>
+          <a:chOff x="0" y="0"/>
+          <a:chExt cx="0" cy="0"/>
+        </a:xfrm>
+      </p:grpSpPr>
+      <p:sp>
+        <p:nvSpPr>
+          <p:cNvPr id="2" name="Title 1">
+            <a:extLst>
+              <a:ext uri="{FF2B5EF4-FFF2-40B4-BE49-F238E27FC236}">
+                <a16:creationId xmlns:a16="http://schemas.microsoft.com/office/drawing/2014/main" id="{AE15C177-A276-409F-D565-A5EA6BFCE394}"/>
+              </a:ext>
+            </a:extLst>
+          </p:cNvPr>
+          <p:cNvSpPr>
+            <a:spLocks noGrp="1"/>
+          </p:cNvSpPr>
+          <p:nvPr>
+            <p:ph type="title"/>
+          </p:nvPr>
+        </p:nvSpPr>
+        <p:spPr/>
+        <p:txBody>
+          <a:bodyPr/>
+          <a:lstStyle/>
+          <a:p>
+            <a:r>
+              <a:rPr lang="en-US" dirty="0"/>
+              <a:t>Constructors w/ One Parameter</a:t>
+            </a:r>
+          </a:p>
+        </p:txBody>
+      </p:sp>
+      <p:sp>
+        <p:nvSpPr>
+          <p:cNvPr id="3" name="Content Placeholder 2">
+            <a:extLst>
+              <a:ext uri="{FF2B5EF4-FFF2-40B4-BE49-F238E27FC236}">
+                <a16:creationId xmlns:a16="http://schemas.microsoft.com/office/drawing/2014/main" id="{A835F7EE-234A-AC7D-A283-2D58EA194C96}"/>
+              </a:ext>
+            </a:extLst>
+          </p:cNvPr>
+          <p:cNvSpPr>
+            <a:spLocks noGrp="1"/>
+          </p:cNvSpPr>
+          <p:nvPr>
+            <p:ph idx="1"/>
+          </p:nvPr>
+        </p:nvSpPr>
+        <p:spPr/>
+        <p:txBody>
+          <a:bodyPr/>
+          <a:lstStyle/>
+          <a:p>
+            <a:r>
+              <a:rPr lang="en-US" dirty="0"/>
+              <a:t>Unless marked as </a:t>
+            </a:r>
+            <a:r>
+              <a:rPr lang="en-US" b="1" dirty="0">
+                <a:latin typeface="Consolas" panose="020B0609020204030204" pitchFamily="49" charset="0"/>
+                <a:cs typeface="Consolas" panose="020B0609020204030204" pitchFamily="49" charset="0"/>
+              </a:rPr>
+              <a:t>explicit</a:t>
+            </a:r>
+            <a:r>
+              <a:rPr lang="en-US" dirty="0"/>
+              <a:t>, </a:t>
+            </a:r>
+            <a:r>
+              <a:rPr lang="en-US" i="1" dirty="0"/>
+              <a:t>constructors that can be called with one argument are taken as an implicit conversion from the type of the argument to the type of the class</a:t>
+            </a:r>
+            <a:r>
+              <a:rPr lang="en-US" dirty="0"/>
+              <a:t>.</a:t>
+            </a:r>
+          </a:p>
+        </p:txBody>
+      </p:sp>
+      <p:sp>
+        <p:nvSpPr>
+          <p:cNvPr id="4" name="TextBox 3">
+            <a:extLst>
+              <a:ext uri="{FF2B5EF4-FFF2-40B4-BE49-F238E27FC236}">
+                <a16:creationId xmlns:a16="http://schemas.microsoft.com/office/drawing/2014/main" id="{727E2DD7-10DF-4561-44C2-2B3B3CA27C25}"/>
+              </a:ext>
+            </a:extLst>
+          </p:cNvPr>
+          <p:cNvSpPr txBox="1"/>
+          <p:nvPr/>
+        </p:nvSpPr>
+        <p:spPr>
+          <a:xfrm>
+            <a:off x="1349828" y="3429000"/>
+            <a:ext cx="4110421" cy="369332"/>
+          </a:xfrm>
+          <a:prstGeom prst="rect">
+            <a:avLst/>
+          </a:prstGeom>
+          <a:noFill/>
+        </p:spPr>
+        <p:txBody>
+          <a:bodyPr wrap="none" rtlCol="0">
+            <a:spAutoFit/>
+          </a:bodyPr>
+          <a:lstStyle/>
+          <a:p>
+            <a:r>
+              <a:rPr lang="en-US" dirty="0">
+                <a:latin typeface="Consolas" panose="020B0609020204030204" pitchFamily="49" charset="0"/>
+                <a:cs typeface="Consolas" panose="020B0609020204030204" pitchFamily="49" charset="0"/>
+              </a:rPr>
+              <a:t>std::string s = “Hello, World”;</a:t>
+            </a:r>
+          </a:p>
+        </p:txBody>
+      </p:sp>
+      <p:sp>
+        <p:nvSpPr>
+          <p:cNvPr id="6" name="TextBox 5">
+            <a:extLst>
+              <a:ext uri="{FF2B5EF4-FFF2-40B4-BE49-F238E27FC236}">
+                <a16:creationId xmlns:a16="http://schemas.microsoft.com/office/drawing/2014/main" id="{BAEB661A-5787-2F43-4FFF-F550ABA3AA7F}"/>
+              </a:ext>
+            </a:extLst>
+          </p:cNvPr>
+          <p:cNvSpPr txBox="1"/>
+          <p:nvPr/>
+        </p:nvSpPr>
+        <p:spPr>
+          <a:xfrm>
+            <a:off x="5889171" y="3429000"/>
+            <a:ext cx="4013727" cy="369332"/>
+          </a:xfrm>
+          <a:prstGeom prst="rect">
+            <a:avLst/>
+          </a:prstGeom>
+          <a:noFill/>
+        </p:spPr>
+        <p:txBody>
+          <a:bodyPr wrap="none" rtlCol="0">
+            <a:spAutoFit/>
+          </a:bodyPr>
+          <a:lstStyle/>
+          <a:p>
+            <a:r>
+              <a:rPr lang="en-US" dirty="0"/>
+              <a:t>String literals have type: </a:t>
+            </a:r>
+            <a:r>
+              <a:rPr lang="en-US" dirty="0">
+                <a:latin typeface="Consolas" panose="020B0609020204030204" pitchFamily="49" charset="0"/>
+                <a:cs typeface="Consolas" panose="020B0609020204030204" pitchFamily="49" charset="0"/>
+              </a:rPr>
+              <a:t>const char *</a:t>
+            </a:r>
+          </a:p>
+        </p:txBody>
+      </p:sp>
+      <p:sp>
+        <p:nvSpPr>
+          <p:cNvPr id="7" name="TextBox 6">
+            <a:extLst>
+              <a:ext uri="{FF2B5EF4-FFF2-40B4-BE49-F238E27FC236}">
+                <a16:creationId xmlns:a16="http://schemas.microsoft.com/office/drawing/2014/main" id="{2CBA5734-FD44-4BED-7A44-D48FFA7BBBCC}"/>
+              </a:ext>
+            </a:extLst>
+          </p:cNvPr>
+          <p:cNvSpPr txBox="1"/>
+          <p:nvPr/>
+        </p:nvSpPr>
+        <p:spPr>
+          <a:xfrm>
+            <a:off x="3973004" y="4055319"/>
+            <a:ext cx="7846059" cy="369332"/>
+          </a:xfrm>
+          <a:prstGeom prst="rect">
+            <a:avLst/>
+          </a:prstGeom>
+          <a:noFill/>
+        </p:spPr>
+        <p:txBody>
+          <a:bodyPr wrap="none" rtlCol="0">
+            <a:spAutoFit/>
+          </a:bodyPr>
+          <a:lstStyle/>
+          <a:p>
+            <a:r>
+              <a:rPr lang="en-US" dirty="0"/>
+              <a:t>There is a constructor for </a:t>
+            </a:r>
+            <a:r>
+              <a:rPr lang="en-US" dirty="0">
+                <a:latin typeface="Consolas" panose="020B0609020204030204" pitchFamily="49" charset="0"/>
+                <a:cs typeface="Consolas" panose="020B0609020204030204" pitchFamily="49" charset="0"/>
+              </a:rPr>
+              <a:t>std::string</a:t>
+            </a:r>
+            <a:r>
+              <a:rPr lang="en-US" dirty="0"/>
+              <a:t> that takes a </a:t>
+            </a:r>
+            <a:r>
+              <a:rPr lang="en-US" dirty="0">
+                <a:latin typeface="Consolas" panose="020B0609020204030204" pitchFamily="49" charset="0"/>
+                <a:cs typeface="Consolas" panose="020B0609020204030204" pitchFamily="49" charset="0"/>
+              </a:rPr>
+              <a:t>const char * </a:t>
+            </a:r>
+            <a:r>
+              <a:rPr lang="en-US" dirty="0"/>
+              <a:t>parameter.</a:t>
+            </a:r>
+          </a:p>
+        </p:txBody>
+      </p:sp>
+      <p:sp>
+        <p:nvSpPr>
+          <p:cNvPr id="8" name="TextBox 7">
+            <a:extLst>
+              <a:ext uri="{FF2B5EF4-FFF2-40B4-BE49-F238E27FC236}">
+                <a16:creationId xmlns:a16="http://schemas.microsoft.com/office/drawing/2014/main" id="{E82816B1-815D-C520-4D72-7268F97EEC0C}"/>
+              </a:ext>
+            </a:extLst>
+          </p:cNvPr>
+          <p:cNvSpPr txBox="1"/>
+          <p:nvPr/>
+        </p:nvSpPr>
+        <p:spPr>
+          <a:xfrm>
+            <a:off x="3633638" y="4681638"/>
+            <a:ext cx="6778651" cy="1200329"/>
+          </a:xfrm>
+          <a:prstGeom prst="rect">
+            <a:avLst/>
+          </a:prstGeom>
+          <a:noFill/>
+        </p:spPr>
+        <p:txBody>
+          <a:bodyPr wrap="none" rtlCol="0">
+            <a:spAutoFit/>
+          </a:bodyPr>
+          <a:lstStyle/>
+          <a:p>
+            <a:r>
+              <a:rPr lang="en-US" dirty="0"/>
+              <a:t>Compiler uses that constructor to create a </a:t>
+            </a:r>
+            <a:r>
+              <a:rPr lang="en-US" dirty="0">
+                <a:latin typeface="Consolas" panose="020B0609020204030204" pitchFamily="49" charset="0"/>
+                <a:cs typeface="Consolas" panose="020B0609020204030204" pitchFamily="49" charset="0"/>
+              </a:rPr>
+              <a:t>std::string</a:t>
+            </a:r>
+            <a:r>
+              <a:rPr lang="en-US" dirty="0"/>
+              <a:t> temporary…</a:t>
+            </a:r>
+          </a:p>
+          <a:p>
+            <a:r>
+              <a:rPr lang="en-US" dirty="0"/>
+              <a:t>… and then initializes </a:t>
+            </a:r>
+            <a:r>
+              <a:rPr lang="en-US" dirty="0">
+                <a:latin typeface="Consolas" panose="020B0609020204030204" pitchFamily="49" charset="0"/>
+                <a:cs typeface="Consolas" panose="020B0609020204030204" pitchFamily="49" charset="0"/>
+              </a:rPr>
+              <a:t>s</a:t>
+            </a:r>
+            <a:r>
+              <a:rPr lang="en-US" dirty="0"/>
+              <a:t> from that temporary.</a:t>
+            </a:r>
+          </a:p>
+          <a:p>
+            <a:endParaRPr lang="en-US" dirty="0"/>
+          </a:p>
+          <a:p>
+            <a:r>
+              <a:rPr lang="en-US" dirty="0"/>
+              <a:t>In this case, the temporary can be (and most likely is) optimized away.</a:t>
+            </a:r>
+          </a:p>
+        </p:txBody>
+      </p:sp>
+      <p:cxnSp>
+        <p:nvCxnSpPr>
+          <p:cNvPr id="10" name="Straight Arrow Connector 9">
+            <a:extLst>
+              <a:ext uri="{FF2B5EF4-FFF2-40B4-BE49-F238E27FC236}">
+                <a16:creationId xmlns:a16="http://schemas.microsoft.com/office/drawing/2014/main" id="{6B028EAE-2A54-6A11-54C2-FEAD760C5C05}"/>
+              </a:ext>
+            </a:extLst>
+          </p:cNvPr>
+          <p:cNvCxnSpPr>
+            <a:stCxn id="6" idx="1"/>
+          </p:cNvCxnSpPr>
+          <p:nvPr/>
+        </p:nvCxnSpPr>
+        <p:spPr>
+          <a:xfrm flipH="1">
+            <a:off x="5323114" y="3613666"/>
+            <a:ext cx="566057" cy="0"/>
+          </a:xfrm>
+          <a:prstGeom prst="straightConnector1">
+            <a:avLst/>
+          </a:prstGeom>
+          <a:ln>
+            <a:tailEnd type="triangle"/>
+          </a:ln>
+        </p:spPr>
+        <p:style>
+          <a:lnRef idx="1">
+            <a:schemeClr val="accent1"/>
+          </a:lnRef>
+          <a:fillRef idx="0">
+            <a:schemeClr val="accent1"/>
+          </a:fillRef>
+          <a:effectRef idx="0">
+            <a:schemeClr val="accent1"/>
+          </a:effectRef>
+          <a:fontRef idx="minor">
+            <a:schemeClr val="tx1"/>
+          </a:fontRef>
+        </p:style>
+      </p:cxnSp>
+      <p:cxnSp>
+        <p:nvCxnSpPr>
+          <p:cNvPr id="14" name="Straight Arrow Connector 13">
+            <a:extLst>
+              <a:ext uri="{FF2B5EF4-FFF2-40B4-BE49-F238E27FC236}">
+                <a16:creationId xmlns:a16="http://schemas.microsoft.com/office/drawing/2014/main" id="{ED5BA0BA-A536-0E2D-C943-DD4E44E00BE4}"/>
+              </a:ext>
+            </a:extLst>
+          </p:cNvPr>
+          <p:cNvCxnSpPr>
+            <a:stCxn id="8" idx="1"/>
+          </p:cNvCxnSpPr>
+          <p:nvPr/>
+        </p:nvCxnSpPr>
+        <p:spPr>
+          <a:xfrm flipH="1" flipV="1">
+            <a:off x="3069771" y="3798332"/>
+            <a:ext cx="563867" cy="1483471"/>
+          </a:xfrm>
+          <a:prstGeom prst="straightConnector1">
+            <a:avLst/>
+          </a:prstGeom>
+          <a:ln>
+            <a:tailEnd type="triangle"/>
+          </a:ln>
+        </p:spPr>
+        <p:style>
+          <a:lnRef idx="1">
+            <a:schemeClr val="accent1"/>
+          </a:lnRef>
+          <a:fillRef idx="0">
+            <a:schemeClr val="accent1"/>
+          </a:fillRef>
+          <a:effectRef idx="0">
+            <a:schemeClr val="accent1"/>
+          </a:effectRef>
+          <a:fontRef idx="minor">
+            <a:schemeClr val="tx1"/>
+          </a:fontRef>
+        </p:style>
+      </p:cxnSp>
+    </p:spTree>
+    <p:extLst>
+      <p:ext uri="{BB962C8B-B14F-4D97-AF65-F5344CB8AC3E}">
+        <p14:creationId xmlns:p14="http://schemas.microsoft.com/office/powerpoint/2010/main" val="1729684465"/>
+      </p:ext>
+    </p:extLst>
+  </p:cSld>
+  <p:clrMapOvr>
+    <a:masterClrMapping/>
+  </p:clrMapOvr>
+</p:sld>
+</file>
+
+<file path=ppt/slides/slide19.xml><?xml version="1.0" encoding="utf-8"?>
+<p:sld xmlns:a="http://schemas.openxmlformats.org/drawingml/2006/main" xmlns:r="http://schemas.openxmlformats.org/officeDocument/2006/relationships" xmlns:p="http://schemas.openxmlformats.org/presentationml/2006/main">
+  <p:cSld>
+    <p:spTree>
+      <p:nvGrpSpPr>
+        <p:cNvPr id="1" name=""/>
+        <p:cNvGrpSpPr/>
+        <p:nvPr/>
+      </p:nvGrpSpPr>
+      <p:grpSpPr>
+        <a:xfrm>
+          <a:off x="0" y="0"/>
+          <a:ext cx="0" cy="0"/>
+          <a:chOff x="0" y="0"/>
+          <a:chExt cx="0" cy="0"/>
+        </a:xfrm>
+      </p:grpSpPr>
+      <p:sp>
+        <p:nvSpPr>
+          <p:cNvPr id="2" name="Title 1">
+            <a:extLst>
+              <a:ext uri="{FF2B5EF4-FFF2-40B4-BE49-F238E27FC236}">
+                <a16:creationId xmlns:a16="http://schemas.microsoft.com/office/drawing/2014/main" id="{4181A3FC-4C27-233B-8496-B0C634BFB1E2}"/>
+              </a:ext>
+            </a:extLst>
+          </p:cNvPr>
+          <p:cNvSpPr>
+            <a:spLocks noGrp="1"/>
+          </p:cNvSpPr>
+          <p:nvPr>
+            <p:ph type="title"/>
+          </p:nvPr>
+        </p:nvSpPr>
+        <p:spPr/>
+        <p:txBody>
+          <a:bodyPr/>
+          <a:lstStyle/>
+          <a:p>
+            <a:r>
+              <a:rPr lang="en-US" dirty="0"/>
+              <a:t>Another (more typical?) Example</a:t>
+            </a:r>
+          </a:p>
+        </p:txBody>
+      </p:sp>
+      <p:sp>
+        <p:nvSpPr>
+          <p:cNvPr id="3" name="Content Placeholder 2">
+            <a:extLst>
+              <a:ext uri="{FF2B5EF4-FFF2-40B4-BE49-F238E27FC236}">
+                <a16:creationId xmlns:a16="http://schemas.microsoft.com/office/drawing/2014/main" id="{434AB4F2-3E90-1892-BF18-5C7347949E10}"/>
+              </a:ext>
+            </a:extLst>
+          </p:cNvPr>
+          <p:cNvSpPr>
+            <a:spLocks noGrp="1"/>
+          </p:cNvSpPr>
+          <p:nvPr>
+            <p:ph idx="1"/>
+          </p:nvPr>
+        </p:nvSpPr>
+        <p:spPr/>
+        <p:txBody>
+          <a:bodyPr/>
+          <a:lstStyle/>
+          <a:p>
+            <a:r>
+              <a:rPr lang="en-US" dirty="0"/>
+              <a:t>This shows the implicit conversion being used with an argument</a:t>
+            </a:r>
+          </a:p>
+        </p:txBody>
+      </p:sp>
+      <p:sp>
+        <p:nvSpPr>
+          <p:cNvPr id="4" name="TextBox 3">
+            <a:extLst>
+              <a:ext uri="{FF2B5EF4-FFF2-40B4-BE49-F238E27FC236}">
+                <a16:creationId xmlns:a16="http://schemas.microsoft.com/office/drawing/2014/main" id="{65CAD7E7-42A9-2CF4-CFCE-4B13AC79A63A}"/>
+              </a:ext>
+            </a:extLst>
+          </p:cNvPr>
+          <p:cNvSpPr txBox="1"/>
+          <p:nvPr/>
+        </p:nvSpPr>
+        <p:spPr>
+          <a:xfrm>
+            <a:off x="1415143" y="2590801"/>
+            <a:ext cx="6896440" cy="923330"/>
+          </a:xfrm>
+          <a:prstGeom prst="rect">
+            <a:avLst/>
+          </a:prstGeom>
+          <a:noFill/>
+        </p:spPr>
+        <p:txBody>
+          <a:bodyPr wrap="none" rtlCol="0">
+            <a:spAutoFit/>
+          </a:bodyPr>
+          <a:lstStyle/>
+          <a:p>
+            <a:r>
+              <a:rPr lang="en-US" b="1" dirty="0">
+                <a:latin typeface="Consolas" panose="020B0609020204030204" pitchFamily="49" charset="0"/>
+                <a:cs typeface="Consolas" panose="020B0609020204030204" pitchFamily="49" charset="0"/>
+              </a:rPr>
+              <a:t>void</a:t>
+            </a:r>
+            <a:r>
+              <a:rPr lang="en-US" dirty="0">
+                <a:latin typeface="Consolas" panose="020B0609020204030204" pitchFamily="49" charset="0"/>
+                <a:cs typeface="Consolas" panose="020B0609020204030204" pitchFamily="49" charset="0"/>
+              </a:rPr>
+              <a:t> </a:t>
+            </a:r>
+            <a:r>
+              <a:rPr lang="en-US" dirty="0" err="1">
+                <a:latin typeface="Consolas" panose="020B0609020204030204" pitchFamily="49" charset="0"/>
+                <a:cs typeface="Consolas" panose="020B0609020204030204" pitchFamily="49" charset="0"/>
+              </a:rPr>
+              <a:t>process_string</a:t>
+            </a:r>
+            <a:r>
+              <a:rPr lang="en-US" dirty="0">
+                <a:latin typeface="Consolas" panose="020B0609020204030204" pitchFamily="49" charset="0"/>
+                <a:cs typeface="Consolas" panose="020B0609020204030204" pitchFamily="49" charset="0"/>
+              </a:rPr>
+              <a:t>( </a:t>
+            </a:r>
+            <a:r>
+              <a:rPr lang="en-US" b="1" dirty="0">
+                <a:latin typeface="Consolas" panose="020B0609020204030204" pitchFamily="49" charset="0"/>
+                <a:cs typeface="Consolas" panose="020B0609020204030204" pitchFamily="49" charset="0"/>
+              </a:rPr>
+              <a:t>const</a:t>
+            </a:r>
+            <a:r>
+              <a:rPr lang="en-US" dirty="0">
+                <a:latin typeface="Consolas" panose="020B0609020204030204" pitchFamily="49" charset="0"/>
+                <a:cs typeface="Consolas" panose="020B0609020204030204" pitchFamily="49" charset="0"/>
+              </a:rPr>
+              <a:t> std::string &amp;</a:t>
+            </a:r>
+            <a:r>
+              <a:rPr lang="en-US" dirty="0" err="1">
+                <a:latin typeface="Consolas" panose="020B0609020204030204" pitchFamily="49" charset="0"/>
+                <a:cs typeface="Consolas" panose="020B0609020204030204" pitchFamily="49" charset="0"/>
+              </a:rPr>
+              <a:t>process_me</a:t>
+            </a:r>
+            <a:r>
+              <a:rPr lang="en-US" dirty="0">
+                <a:latin typeface="Consolas" panose="020B0609020204030204" pitchFamily="49" charset="0"/>
+                <a:cs typeface="Consolas" panose="020B0609020204030204" pitchFamily="49" charset="0"/>
+              </a:rPr>
+              <a:t> );</a:t>
+            </a:r>
+          </a:p>
+          <a:p>
+            <a:endParaRPr lang="en-US" dirty="0">
+              <a:latin typeface="Consolas" panose="020B0609020204030204" pitchFamily="49" charset="0"/>
+              <a:cs typeface="Consolas" panose="020B0609020204030204" pitchFamily="49" charset="0"/>
+            </a:endParaRPr>
+          </a:p>
+          <a:p>
+            <a:r>
+              <a:rPr lang="en-US" dirty="0" err="1">
+                <a:latin typeface="Consolas" panose="020B0609020204030204" pitchFamily="49" charset="0"/>
+                <a:cs typeface="Consolas" panose="020B0609020204030204" pitchFamily="49" charset="0"/>
+              </a:rPr>
+              <a:t>process_string</a:t>
+            </a:r>
+            <a:r>
+              <a:rPr lang="en-US" dirty="0">
+                <a:latin typeface="Consolas" panose="020B0609020204030204" pitchFamily="49" charset="0"/>
+                <a:cs typeface="Consolas" panose="020B0609020204030204" pitchFamily="49" charset="0"/>
+              </a:rPr>
+              <a:t>( “Hello, World” );</a:t>
+            </a:r>
+          </a:p>
+        </p:txBody>
+      </p:sp>
+      <p:sp>
+        <p:nvSpPr>
+          <p:cNvPr id="5" name="TextBox 4">
+            <a:extLst>
+              <a:ext uri="{FF2B5EF4-FFF2-40B4-BE49-F238E27FC236}">
+                <a16:creationId xmlns:a16="http://schemas.microsoft.com/office/drawing/2014/main" id="{95C642F9-E87F-61B2-7BD4-4D5E77776AEE}"/>
+              </a:ext>
+            </a:extLst>
+          </p:cNvPr>
+          <p:cNvSpPr txBox="1"/>
+          <p:nvPr/>
+        </p:nvSpPr>
+        <p:spPr>
+          <a:xfrm>
+            <a:off x="1694763" y="4279307"/>
+            <a:ext cx="8802474" cy="1477328"/>
+          </a:xfrm>
+          <a:prstGeom prst="rect">
+            <a:avLst/>
+          </a:prstGeom>
+          <a:noFill/>
+        </p:spPr>
+        <p:txBody>
+          <a:bodyPr wrap="none" rtlCol="0">
+            <a:spAutoFit/>
+          </a:bodyPr>
+          <a:lstStyle/>
+          <a:p>
+            <a:pPr algn="ctr"/>
+            <a:r>
+              <a:rPr lang="en-US" dirty="0"/>
+              <a:t>Here the compiler uses the single parameter constructor taking </a:t>
+            </a:r>
+            <a:r>
+              <a:rPr lang="en-US" dirty="0">
+                <a:latin typeface="Consolas" panose="020B0609020204030204" pitchFamily="49" charset="0"/>
+                <a:cs typeface="Consolas" panose="020B0609020204030204" pitchFamily="49" charset="0"/>
+              </a:rPr>
+              <a:t>const char *</a:t>
+            </a:r>
+            <a:r>
+              <a:rPr lang="en-US" dirty="0"/>
+              <a:t> to create</a:t>
+            </a:r>
+          </a:p>
+          <a:p>
+            <a:pPr algn="ctr"/>
+            <a:r>
+              <a:rPr lang="en-US" dirty="0"/>
+              <a:t>a </a:t>
+            </a:r>
+            <a:r>
+              <a:rPr lang="en-US" dirty="0">
+                <a:latin typeface="Consolas" panose="020B0609020204030204" pitchFamily="49" charset="0"/>
+                <a:cs typeface="Consolas" panose="020B0609020204030204" pitchFamily="49" charset="0"/>
+              </a:rPr>
+              <a:t>std::string</a:t>
+            </a:r>
+            <a:r>
+              <a:rPr lang="en-US" dirty="0"/>
+              <a:t> temporary for </a:t>
+            </a:r>
+            <a:r>
+              <a:rPr lang="en-US" dirty="0" err="1">
+                <a:latin typeface="Consolas" panose="020B0609020204030204" pitchFamily="49" charset="0"/>
+                <a:cs typeface="Consolas" panose="020B0609020204030204" pitchFamily="49" charset="0"/>
+              </a:rPr>
+              <a:t>process_string</a:t>
+            </a:r>
+            <a:r>
+              <a:rPr lang="en-US" dirty="0"/>
+              <a:t>.</a:t>
+            </a:r>
+          </a:p>
+          <a:p>
+            <a:pPr algn="ctr"/>
+            <a:endParaRPr lang="en-US" dirty="0"/>
+          </a:p>
+          <a:p>
+            <a:pPr algn="ctr"/>
+            <a:r>
+              <a:rPr lang="en-US" dirty="0"/>
+              <a:t>Notice this only works because the parameter of </a:t>
+            </a:r>
+            <a:r>
+              <a:rPr lang="en-US" dirty="0" err="1">
+                <a:latin typeface="Consolas" panose="020B0609020204030204" pitchFamily="49" charset="0"/>
+                <a:cs typeface="Consolas" panose="020B0609020204030204" pitchFamily="49" charset="0"/>
+              </a:rPr>
+              <a:t>process_string</a:t>
+            </a:r>
+            <a:r>
+              <a:rPr lang="en-US" dirty="0"/>
+              <a:t> is a reference to </a:t>
+            </a:r>
+            <a:r>
+              <a:rPr lang="en-US" dirty="0">
+                <a:latin typeface="Consolas" panose="020B0609020204030204" pitchFamily="49" charset="0"/>
+                <a:cs typeface="Consolas" panose="020B0609020204030204" pitchFamily="49" charset="0"/>
+              </a:rPr>
+              <a:t>const</a:t>
+            </a:r>
+            <a:r>
+              <a:rPr lang="en-US" dirty="0"/>
+              <a:t>.</a:t>
+            </a:r>
+          </a:p>
+          <a:p>
+            <a:pPr algn="ctr"/>
+            <a:r>
+              <a:rPr lang="en-US" dirty="0"/>
+              <a:t>Otherwise, the compiler won’t bind that reference to a temporary.</a:t>
+            </a:r>
+          </a:p>
+        </p:txBody>
+      </p:sp>
+      <p:cxnSp>
+        <p:nvCxnSpPr>
+          <p:cNvPr id="7" name="Straight Arrow Connector 6">
+            <a:extLst>
+              <a:ext uri="{FF2B5EF4-FFF2-40B4-BE49-F238E27FC236}">
+                <a16:creationId xmlns:a16="http://schemas.microsoft.com/office/drawing/2014/main" id="{3BAFF770-0470-AC10-C1B7-F6620CF76776}"/>
+              </a:ext>
+            </a:extLst>
+          </p:cNvPr>
+          <p:cNvCxnSpPr>
+            <a:stCxn id="5" idx="0"/>
+            <a:endCxn id="4" idx="2"/>
+          </p:cNvCxnSpPr>
+          <p:nvPr/>
+        </p:nvCxnSpPr>
+        <p:spPr>
+          <a:xfrm flipH="1" flipV="1">
+            <a:off x="4863363" y="3514131"/>
+            <a:ext cx="1232637" cy="765176"/>
+          </a:xfrm>
+          <a:prstGeom prst="straightConnector1">
+            <a:avLst/>
+          </a:prstGeom>
+          <a:ln>
+            <a:tailEnd type="triangle"/>
+          </a:ln>
+        </p:spPr>
+        <p:style>
+          <a:lnRef idx="1">
+            <a:schemeClr val="accent1"/>
+          </a:lnRef>
+          <a:fillRef idx="0">
+            <a:schemeClr val="accent1"/>
+          </a:fillRef>
+          <a:effectRef idx="0">
+            <a:schemeClr val="accent1"/>
+          </a:effectRef>
+          <a:fontRef idx="minor">
+            <a:schemeClr val="tx1"/>
+          </a:fontRef>
+        </p:style>
+      </p:cxnSp>
+    </p:spTree>
+    <p:extLst>
+      <p:ext uri="{BB962C8B-B14F-4D97-AF65-F5344CB8AC3E}">
+        <p14:creationId xmlns:p14="http://schemas.microsoft.com/office/powerpoint/2010/main" val="1034385918"/>
+      </p:ext>
+    </p:extLst>
+  </p:cSld>
+  <p:clrMapOvr>
+    <a:masterClrMapping/>
+  </p:clrMapOvr>
+</p:sld>
+</file>
+
 <file path=ppt/slides/slide2.xml><?xml version="1.0" encoding="utf-8"?>
 <p:sld xmlns:a="http://schemas.openxmlformats.org/drawingml/2006/main" xmlns:r="http://schemas.openxmlformats.org/officeDocument/2006/relationships" xmlns:p="http://schemas.openxmlformats.org/presentationml/2006/main">
   <p:cSld>
@@ -3137,54 +5888,89 @@
             <a:br>
               <a:rPr lang="en-US" dirty="0"/>
             </a:br>
-            <a:r>
-              <a:rPr lang="en-US" sz="1600" dirty="0"/>
-              <a:t> </a:t>
-            </a:r>
             <a:br>
               <a:rPr lang="en-US" dirty="0"/>
             </a:br>
-            <a:r>
-              <a:rPr lang="en-US" sz="2000" dirty="0">
+            <a:br>
+              <a:rPr lang="en-US" dirty="0"/>
+            </a:br>
+            <a:endParaRPr lang="en-US" sz="2000" dirty="0">
+              <a:latin typeface="Consolas" panose="020B0609020204030204" pitchFamily="49" charset="0"/>
+              <a:cs typeface="Consolas" panose="020B0609020204030204" pitchFamily="49" charset="0"/>
+            </a:endParaRPr>
+          </a:p>
+          <a:p>
+            <a:r>
+              <a:rPr lang="en-US" dirty="0"/>
+              <a:t>The target type in parenthesis goes in front of what is to be converted.</a:t>
+            </a:r>
+          </a:p>
+          <a:p>
+            <a:r>
+              <a:rPr lang="en-US" dirty="0"/>
+              <a:t>The C-style cast operator is available in C++ for C compatibility…</a:t>
+            </a:r>
+          </a:p>
+          <a:p>
+            <a:pPr lvl="1"/>
+            <a:r>
+              <a:rPr lang="en-US" dirty="0"/>
+              <a:t>… but C++ has other, better ways to express type conversions.</a:t>
+            </a:r>
+          </a:p>
+          <a:p>
+            <a:endParaRPr lang="en-US" dirty="0"/>
+          </a:p>
+        </p:txBody>
+      </p:sp>
+      <p:sp>
+        <p:nvSpPr>
+          <p:cNvPr id="4" name="TextBox 3">
+            <a:extLst>
+              <a:ext uri="{FF2B5EF4-FFF2-40B4-BE49-F238E27FC236}">
+                <a16:creationId xmlns:a16="http://schemas.microsoft.com/office/drawing/2014/main" id="{3F5B00B2-CCCF-262A-4E0C-92D37D929DAA}"/>
+              </a:ext>
+            </a:extLst>
+          </p:cNvPr>
+          <p:cNvSpPr txBox="1"/>
+          <p:nvPr/>
+        </p:nvSpPr>
+        <p:spPr>
+          <a:xfrm>
+            <a:off x="1273629" y="2873828"/>
+            <a:ext cx="5756704" cy="646331"/>
+          </a:xfrm>
+          <a:prstGeom prst="rect">
+            <a:avLst/>
+          </a:prstGeom>
+          <a:noFill/>
+        </p:spPr>
+        <p:txBody>
+          <a:bodyPr wrap="none" rtlCol="0">
+            <a:spAutoFit/>
+          </a:bodyPr>
+          <a:lstStyle/>
+          <a:p>
+            <a:r>
+              <a:rPr lang="en-US" sz="1800" dirty="0">
                 <a:latin typeface="Consolas" panose="020B0609020204030204" pitchFamily="49" charset="0"/>
                 <a:cs typeface="Consolas" panose="020B0609020204030204" pitchFamily="49" charset="0"/>
               </a:rPr>
               <a:t>long x = 42L;    // ‘L’ suffix means “long.”</a:t>
             </a:r>
             <a:br>
-              <a:rPr lang="en-US" sz="2000" dirty="0">
+              <a:rPr lang="en-US" sz="1800" dirty="0">
                 <a:latin typeface="Consolas" panose="020B0609020204030204" pitchFamily="49" charset="0"/>
                 <a:cs typeface="Consolas" panose="020B0609020204030204" pitchFamily="49" charset="0"/>
               </a:rPr>
             </a:br>
             <a:r>
-              <a:rPr lang="en-US" sz="2000" dirty="0">
+              <a:rPr lang="en-US" sz="1800" dirty="0">
                 <a:latin typeface="Consolas" panose="020B0609020204030204" pitchFamily="49" charset="0"/>
                 <a:cs typeface="Consolas" panose="020B0609020204030204" pitchFamily="49" charset="0"/>
               </a:rPr>
               <a:t>int y = (int)x;  // A type “cast.”</a:t>
             </a:r>
-          </a:p>
-          <a:p>
-            <a:r>
-              <a:rPr lang="en-US" dirty="0"/>
-              <a:t>The target type in parenthesis goes in front of what is to be converted.</a:t>
-            </a:r>
-          </a:p>
-          <a:p>
-            <a:r>
-              <a:rPr lang="en-US" dirty="0"/>
-              <a:t>The C-style cast operator is available in C++ for C compatibility…</a:t>
-            </a:r>
-          </a:p>
-          <a:p>
-            <a:pPr lvl="1"/>
-            <a:r>
-              <a:rPr lang="en-US" dirty="0"/>
-              <a:t>… but C++ has other, better ways to express type conversions.</a:t>
-            </a:r>
-          </a:p>
-          <a:p>
             <a:endParaRPr lang="en-US" dirty="0"/>
           </a:p>
         </p:txBody>
@@ -3193,6 +5979,764 @@
     <p:extLst>
       <p:ext uri="{BB962C8B-B14F-4D97-AF65-F5344CB8AC3E}">
         <p14:creationId xmlns:p14="http://schemas.microsoft.com/office/powerpoint/2010/main" val="3519084762"/>
+      </p:ext>
+    </p:extLst>
+  </p:cSld>
+  <p:clrMapOvr>
+    <a:masterClrMapping/>
+  </p:clrMapOvr>
+</p:sld>
+</file>
+
+<file path=ppt/slides/slide20.xml><?xml version="1.0" encoding="utf-8"?>
+<p:sld xmlns:a="http://schemas.openxmlformats.org/drawingml/2006/main" xmlns:r="http://schemas.openxmlformats.org/officeDocument/2006/relationships" xmlns:p="http://schemas.openxmlformats.org/presentationml/2006/main">
+  <p:cSld>
+    <p:spTree>
+      <p:nvGrpSpPr>
+        <p:cNvPr id="1" name=""/>
+        <p:cNvGrpSpPr/>
+        <p:nvPr/>
+      </p:nvGrpSpPr>
+      <p:grpSpPr>
+        <a:xfrm>
+          <a:off x="0" y="0"/>
+          <a:ext cx="0" cy="0"/>
+          <a:chOff x="0" y="0"/>
+          <a:chExt cx="0" cy="0"/>
+        </a:xfrm>
+      </p:grpSpPr>
+      <p:sp>
+        <p:nvSpPr>
+          <p:cNvPr id="2" name="Title 1">
+            <a:extLst>
+              <a:ext uri="{FF2B5EF4-FFF2-40B4-BE49-F238E27FC236}">
+                <a16:creationId xmlns:a16="http://schemas.microsoft.com/office/drawing/2014/main" id="{5960DC60-FDF9-B1B2-D4C5-50796FCF9C67}"/>
+              </a:ext>
+            </a:extLst>
+          </p:cNvPr>
+          <p:cNvSpPr>
+            <a:spLocks noGrp="1"/>
+          </p:cNvSpPr>
+          <p:nvPr>
+            <p:ph type="title"/>
+          </p:nvPr>
+        </p:nvSpPr>
+        <p:spPr/>
+        <p:txBody>
+          <a:bodyPr/>
+          <a:lstStyle/>
+          <a:p>
+            <a:r>
+              <a:rPr lang="en-US" dirty="0"/>
+              <a:t>Converting From Class</a:t>
+            </a:r>
+          </a:p>
+        </p:txBody>
+      </p:sp>
+      <p:sp>
+        <p:nvSpPr>
+          <p:cNvPr id="3" name="Content Placeholder 2">
+            <a:extLst>
+              <a:ext uri="{FF2B5EF4-FFF2-40B4-BE49-F238E27FC236}">
+                <a16:creationId xmlns:a16="http://schemas.microsoft.com/office/drawing/2014/main" id="{1ABEF69D-7F27-3A43-5EF2-7AA9077EEE92}"/>
+              </a:ext>
+            </a:extLst>
+          </p:cNvPr>
+          <p:cNvSpPr>
+            <a:spLocks noGrp="1"/>
+          </p:cNvSpPr>
+          <p:nvPr>
+            <p:ph idx="1"/>
+          </p:nvPr>
+        </p:nvSpPr>
+        <p:spPr/>
+        <p:txBody>
+          <a:bodyPr/>
+          <a:lstStyle/>
+          <a:p>
+            <a:r>
+              <a:rPr lang="en-US" dirty="0"/>
+              <a:t>To implicitly convert a class instance to some other type, use conversion operators:</a:t>
+            </a:r>
+          </a:p>
+        </p:txBody>
+      </p:sp>
+      <p:sp>
+        <p:nvSpPr>
+          <p:cNvPr id="4" name="TextBox 3">
+            <a:extLst>
+              <a:ext uri="{FF2B5EF4-FFF2-40B4-BE49-F238E27FC236}">
+                <a16:creationId xmlns:a16="http://schemas.microsoft.com/office/drawing/2014/main" id="{5FA2F888-0729-C027-F215-A65D3AE262B2}"/>
+              </a:ext>
+            </a:extLst>
+          </p:cNvPr>
+          <p:cNvSpPr txBox="1"/>
+          <p:nvPr/>
+        </p:nvSpPr>
+        <p:spPr>
+          <a:xfrm>
+            <a:off x="1484099" y="3262630"/>
+            <a:ext cx="3857146" cy="1477328"/>
+          </a:xfrm>
+          <a:prstGeom prst="rect">
+            <a:avLst/>
+          </a:prstGeom>
+          <a:noFill/>
+        </p:spPr>
+        <p:txBody>
+          <a:bodyPr wrap="none" rtlCol="0">
+            <a:spAutoFit/>
+          </a:bodyPr>
+          <a:lstStyle/>
+          <a:p>
+            <a:r>
+              <a:rPr lang="en-US" b="1" dirty="0">
+                <a:latin typeface="Consolas" panose="020B0609020204030204" pitchFamily="49" charset="0"/>
+                <a:cs typeface="Consolas" panose="020B0609020204030204" pitchFamily="49" charset="0"/>
+              </a:rPr>
+              <a:t>class</a:t>
+            </a:r>
+            <a:r>
+              <a:rPr lang="en-US" dirty="0">
+                <a:latin typeface="Consolas" panose="020B0609020204030204" pitchFamily="49" charset="0"/>
+                <a:cs typeface="Consolas" panose="020B0609020204030204" pitchFamily="49" charset="0"/>
+              </a:rPr>
+              <a:t> </a:t>
+            </a:r>
+            <a:r>
+              <a:rPr lang="en-US" dirty="0" err="1">
+                <a:latin typeface="Consolas" panose="020B0609020204030204" pitchFamily="49" charset="0"/>
+                <a:cs typeface="Consolas" panose="020B0609020204030204" pitchFamily="49" charset="0"/>
+              </a:rPr>
+              <a:t>BigFloat</a:t>
+            </a:r>
+            <a:r>
+              <a:rPr lang="en-US" dirty="0">
+                <a:latin typeface="Consolas" panose="020B0609020204030204" pitchFamily="49" charset="0"/>
+                <a:cs typeface="Consolas" panose="020B0609020204030204" pitchFamily="49" charset="0"/>
+              </a:rPr>
+              <a:t> {</a:t>
+            </a:r>
+          </a:p>
+          <a:p>
+            <a:r>
+              <a:rPr lang="en-US" b="1" dirty="0">
+                <a:latin typeface="Consolas" panose="020B0609020204030204" pitchFamily="49" charset="0"/>
+                <a:cs typeface="Consolas" panose="020B0609020204030204" pitchFamily="49" charset="0"/>
+              </a:rPr>
+              <a:t>public</a:t>
+            </a:r>
+            <a:r>
+              <a:rPr lang="en-US" dirty="0">
+                <a:latin typeface="Consolas" panose="020B0609020204030204" pitchFamily="49" charset="0"/>
+                <a:cs typeface="Consolas" panose="020B0609020204030204" pitchFamily="49" charset="0"/>
+              </a:rPr>
+              <a:t>:</a:t>
+            </a:r>
+          </a:p>
+          <a:p>
+            <a:r>
+              <a:rPr lang="en-US" dirty="0">
+                <a:latin typeface="Consolas" panose="020B0609020204030204" pitchFamily="49" charset="0"/>
+                <a:cs typeface="Consolas" panose="020B0609020204030204" pitchFamily="49" charset="0"/>
+              </a:rPr>
+              <a:t>    // …</a:t>
+            </a:r>
+          </a:p>
+          <a:p>
+            <a:r>
+              <a:rPr lang="en-US" dirty="0">
+                <a:latin typeface="Consolas" panose="020B0609020204030204" pitchFamily="49" charset="0"/>
+                <a:cs typeface="Consolas" panose="020B0609020204030204" pitchFamily="49" charset="0"/>
+              </a:rPr>
+              <a:t>    </a:t>
+            </a:r>
+            <a:r>
+              <a:rPr lang="en-US" b="1" dirty="0">
+                <a:latin typeface="Consolas" panose="020B0609020204030204" pitchFamily="49" charset="0"/>
+                <a:cs typeface="Consolas" panose="020B0609020204030204" pitchFamily="49" charset="0"/>
+              </a:rPr>
+              <a:t>operator</a:t>
+            </a:r>
+            <a:r>
+              <a:rPr lang="en-US" dirty="0">
+                <a:latin typeface="Consolas" panose="020B0609020204030204" pitchFamily="49" charset="0"/>
+                <a:cs typeface="Consolas" panose="020B0609020204030204" pitchFamily="49" charset="0"/>
+              </a:rPr>
+              <a:t> </a:t>
+            </a:r>
+            <a:r>
+              <a:rPr lang="en-US" b="1" dirty="0">
+                <a:latin typeface="Consolas" panose="020B0609020204030204" pitchFamily="49" charset="0"/>
+                <a:cs typeface="Consolas" panose="020B0609020204030204" pitchFamily="49" charset="0"/>
+              </a:rPr>
+              <a:t>double</a:t>
+            </a:r>
+            <a:r>
+              <a:rPr lang="en-US" dirty="0">
+                <a:latin typeface="Consolas" panose="020B0609020204030204" pitchFamily="49" charset="0"/>
+                <a:cs typeface="Consolas" panose="020B0609020204030204" pitchFamily="49" charset="0"/>
+              </a:rPr>
+              <a:t>( ) </a:t>
+            </a:r>
+            <a:r>
+              <a:rPr lang="en-US" b="1" dirty="0">
+                <a:latin typeface="Consolas" panose="020B0609020204030204" pitchFamily="49" charset="0"/>
+                <a:cs typeface="Consolas" panose="020B0609020204030204" pitchFamily="49" charset="0"/>
+              </a:rPr>
+              <a:t>const</a:t>
+            </a:r>
+            <a:r>
+              <a:rPr lang="en-US" dirty="0">
+                <a:latin typeface="Consolas" panose="020B0609020204030204" pitchFamily="49" charset="0"/>
+                <a:cs typeface="Consolas" panose="020B0609020204030204" pitchFamily="49" charset="0"/>
+              </a:rPr>
+              <a:t>;</a:t>
+            </a:r>
+          </a:p>
+          <a:p>
+            <a:r>
+              <a:rPr lang="en-US" dirty="0">
+                <a:latin typeface="Consolas" panose="020B0609020204030204" pitchFamily="49" charset="0"/>
+                <a:cs typeface="Consolas" panose="020B0609020204030204" pitchFamily="49" charset="0"/>
+              </a:rPr>
+              <a:t>};</a:t>
+            </a:r>
+          </a:p>
+        </p:txBody>
+      </p:sp>
+      <p:sp>
+        <p:nvSpPr>
+          <p:cNvPr id="5" name="TextBox 4">
+            <a:extLst>
+              <a:ext uri="{FF2B5EF4-FFF2-40B4-BE49-F238E27FC236}">
+                <a16:creationId xmlns:a16="http://schemas.microsoft.com/office/drawing/2014/main" id="{618B4FC4-0D59-08AC-AB77-12D16425DD53}"/>
+              </a:ext>
+            </a:extLst>
+          </p:cNvPr>
+          <p:cNvSpPr txBox="1"/>
+          <p:nvPr/>
+        </p:nvSpPr>
+        <p:spPr>
+          <a:xfrm>
+            <a:off x="5987144" y="2847132"/>
+            <a:ext cx="4490332" cy="2308324"/>
+          </a:xfrm>
+          <a:prstGeom prst="rect">
+            <a:avLst/>
+          </a:prstGeom>
+          <a:noFill/>
+        </p:spPr>
+        <p:txBody>
+          <a:bodyPr wrap="none" rtlCol="0">
+            <a:spAutoFit/>
+          </a:bodyPr>
+          <a:lstStyle/>
+          <a:p>
+            <a:r>
+              <a:rPr lang="en-US" dirty="0" err="1">
+                <a:latin typeface="Consolas" panose="020B0609020204030204" pitchFamily="49" charset="0"/>
+                <a:cs typeface="Consolas" panose="020B0609020204030204" pitchFamily="49" charset="0"/>
+              </a:rPr>
+              <a:t>BigFloat</a:t>
+            </a:r>
+            <a:r>
+              <a:rPr lang="en-US" dirty="0">
+                <a:latin typeface="Consolas" panose="020B0609020204030204" pitchFamily="49" charset="0"/>
+                <a:cs typeface="Consolas" panose="020B0609020204030204" pitchFamily="49" charset="0"/>
+              </a:rPr>
+              <a:t>::</a:t>
+            </a:r>
+            <a:r>
+              <a:rPr lang="en-US" b="1" dirty="0">
+                <a:latin typeface="Consolas" panose="020B0609020204030204" pitchFamily="49" charset="0"/>
+                <a:cs typeface="Consolas" panose="020B0609020204030204" pitchFamily="49" charset="0"/>
+              </a:rPr>
+              <a:t>operator</a:t>
+            </a:r>
+            <a:r>
+              <a:rPr lang="en-US" dirty="0">
+                <a:latin typeface="Consolas" panose="020B0609020204030204" pitchFamily="49" charset="0"/>
+                <a:cs typeface="Consolas" panose="020B0609020204030204" pitchFamily="49" charset="0"/>
+              </a:rPr>
+              <a:t> </a:t>
+            </a:r>
+            <a:r>
+              <a:rPr lang="en-US" b="1" dirty="0">
+                <a:latin typeface="Consolas" panose="020B0609020204030204" pitchFamily="49" charset="0"/>
+                <a:cs typeface="Consolas" panose="020B0609020204030204" pitchFamily="49" charset="0"/>
+              </a:rPr>
+              <a:t>double</a:t>
+            </a:r>
+            <a:r>
+              <a:rPr lang="en-US" dirty="0">
+                <a:latin typeface="Consolas" panose="020B0609020204030204" pitchFamily="49" charset="0"/>
+                <a:cs typeface="Consolas" panose="020B0609020204030204" pitchFamily="49" charset="0"/>
+              </a:rPr>
+              <a:t>( ) </a:t>
+            </a:r>
+            <a:r>
+              <a:rPr lang="en-US" b="1" dirty="0">
+                <a:latin typeface="Consolas" panose="020B0609020204030204" pitchFamily="49" charset="0"/>
+                <a:cs typeface="Consolas" panose="020B0609020204030204" pitchFamily="49" charset="0"/>
+              </a:rPr>
+              <a:t>const</a:t>
+            </a:r>
+          </a:p>
+          <a:p>
+            <a:r>
+              <a:rPr lang="en-US" dirty="0">
+                <a:latin typeface="Consolas" panose="020B0609020204030204" pitchFamily="49" charset="0"/>
+                <a:cs typeface="Consolas" panose="020B0609020204030204" pitchFamily="49" charset="0"/>
+              </a:rPr>
+              <a:t>{</a:t>
+            </a:r>
+          </a:p>
+          <a:p>
+            <a:r>
+              <a:rPr lang="en-US" dirty="0">
+                <a:latin typeface="Consolas" panose="020B0609020204030204" pitchFamily="49" charset="0"/>
+                <a:cs typeface="Consolas" panose="020B0609020204030204" pitchFamily="49" charset="0"/>
+              </a:rPr>
+              <a:t>    </a:t>
+            </a:r>
+            <a:r>
+              <a:rPr lang="en-US" b="1" dirty="0">
+                <a:latin typeface="Consolas" panose="020B0609020204030204" pitchFamily="49" charset="0"/>
+                <a:cs typeface="Consolas" panose="020B0609020204030204" pitchFamily="49" charset="0"/>
+              </a:rPr>
+              <a:t>double</a:t>
+            </a:r>
+            <a:r>
+              <a:rPr lang="en-US" dirty="0">
+                <a:latin typeface="Consolas" panose="020B0609020204030204" pitchFamily="49" charset="0"/>
+                <a:cs typeface="Consolas" panose="020B0609020204030204" pitchFamily="49" charset="0"/>
+              </a:rPr>
+              <a:t> result;</a:t>
+            </a:r>
+          </a:p>
+          <a:p>
+            <a:endParaRPr lang="en-US" dirty="0">
+              <a:latin typeface="Consolas" panose="020B0609020204030204" pitchFamily="49" charset="0"/>
+              <a:cs typeface="Consolas" panose="020B0609020204030204" pitchFamily="49" charset="0"/>
+            </a:endParaRPr>
+          </a:p>
+          <a:p>
+            <a:r>
+              <a:rPr lang="en-US" dirty="0">
+                <a:latin typeface="Consolas" panose="020B0609020204030204" pitchFamily="49" charset="0"/>
+                <a:cs typeface="Consolas" panose="020B0609020204030204" pitchFamily="49" charset="0"/>
+              </a:rPr>
+              <a:t>    // Do what must be done</a:t>
+            </a:r>
+          </a:p>
+          <a:p>
+            <a:endParaRPr lang="en-US" dirty="0">
+              <a:latin typeface="Consolas" panose="020B0609020204030204" pitchFamily="49" charset="0"/>
+              <a:cs typeface="Consolas" panose="020B0609020204030204" pitchFamily="49" charset="0"/>
+            </a:endParaRPr>
+          </a:p>
+          <a:p>
+            <a:r>
+              <a:rPr lang="en-US" dirty="0">
+                <a:latin typeface="Consolas" panose="020B0609020204030204" pitchFamily="49" charset="0"/>
+                <a:cs typeface="Consolas" panose="020B0609020204030204" pitchFamily="49" charset="0"/>
+              </a:rPr>
+              <a:t>    </a:t>
+            </a:r>
+            <a:r>
+              <a:rPr lang="en-US" b="1" dirty="0">
+                <a:latin typeface="Consolas" panose="020B0609020204030204" pitchFamily="49" charset="0"/>
+                <a:cs typeface="Consolas" panose="020B0609020204030204" pitchFamily="49" charset="0"/>
+              </a:rPr>
+              <a:t>return</a:t>
+            </a:r>
+            <a:r>
+              <a:rPr lang="en-US" dirty="0">
+                <a:latin typeface="Consolas" panose="020B0609020204030204" pitchFamily="49" charset="0"/>
+                <a:cs typeface="Consolas" panose="020B0609020204030204" pitchFamily="49" charset="0"/>
+              </a:rPr>
+              <a:t> result;</a:t>
+            </a:r>
+          </a:p>
+          <a:p>
+            <a:r>
+              <a:rPr lang="en-US" dirty="0">
+                <a:latin typeface="Consolas" panose="020B0609020204030204" pitchFamily="49" charset="0"/>
+                <a:cs typeface="Consolas" panose="020B0609020204030204" pitchFamily="49" charset="0"/>
+              </a:rPr>
+              <a:t>}</a:t>
+            </a:r>
+          </a:p>
+        </p:txBody>
+      </p:sp>
+    </p:spTree>
+    <p:extLst>
+      <p:ext uri="{BB962C8B-B14F-4D97-AF65-F5344CB8AC3E}">
+        <p14:creationId xmlns:p14="http://schemas.microsoft.com/office/powerpoint/2010/main" val="3383336134"/>
+      </p:ext>
+    </p:extLst>
+  </p:cSld>
+  <p:clrMapOvr>
+    <a:masterClrMapping/>
+  </p:clrMapOvr>
+</p:sld>
+</file>
+
+<file path=ppt/slides/slide21.xml><?xml version="1.0" encoding="utf-8"?>
+<p:sld xmlns:a="http://schemas.openxmlformats.org/drawingml/2006/main" xmlns:r="http://schemas.openxmlformats.org/officeDocument/2006/relationships" xmlns:p="http://schemas.openxmlformats.org/presentationml/2006/main">
+  <p:cSld>
+    <p:spTree>
+      <p:nvGrpSpPr>
+        <p:cNvPr id="1" name=""/>
+        <p:cNvGrpSpPr/>
+        <p:nvPr/>
+      </p:nvGrpSpPr>
+      <p:grpSpPr>
+        <a:xfrm>
+          <a:off x="0" y="0"/>
+          <a:ext cx="0" cy="0"/>
+          <a:chOff x="0" y="0"/>
+          <a:chExt cx="0" cy="0"/>
+        </a:xfrm>
+      </p:grpSpPr>
+      <p:sp>
+        <p:nvSpPr>
+          <p:cNvPr id="2" name="Title 1">
+            <a:extLst>
+              <a:ext uri="{FF2B5EF4-FFF2-40B4-BE49-F238E27FC236}">
+                <a16:creationId xmlns:a16="http://schemas.microsoft.com/office/drawing/2014/main" id="{87D1799E-FBDB-F8D4-BC30-2A4389131F1A}"/>
+              </a:ext>
+            </a:extLst>
+          </p:cNvPr>
+          <p:cNvSpPr>
+            <a:spLocks noGrp="1"/>
+          </p:cNvSpPr>
+          <p:nvPr>
+            <p:ph type="title"/>
+          </p:nvPr>
+        </p:nvSpPr>
+        <p:spPr/>
+        <p:txBody>
+          <a:bodyPr/>
+          <a:lstStyle/>
+          <a:p>
+            <a:r>
+              <a:rPr lang="en-US" dirty="0"/>
+              <a:t>Now We Can Do…</a:t>
+            </a:r>
+          </a:p>
+        </p:txBody>
+      </p:sp>
+      <p:sp>
+        <p:nvSpPr>
+          <p:cNvPr id="3" name="Content Placeholder 2">
+            <a:extLst>
+              <a:ext uri="{FF2B5EF4-FFF2-40B4-BE49-F238E27FC236}">
+                <a16:creationId xmlns:a16="http://schemas.microsoft.com/office/drawing/2014/main" id="{DAE79C16-C1CC-106F-85F5-CD1037B158D6}"/>
+              </a:ext>
+            </a:extLst>
+          </p:cNvPr>
+          <p:cNvSpPr>
+            <a:spLocks noGrp="1"/>
+          </p:cNvSpPr>
+          <p:nvPr>
+            <p:ph idx="1"/>
+          </p:nvPr>
+        </p:nvSpPr>
+        <p:spPr/>
+        <p:txBody>
+          <a:bodyPr/>
+          <a:lstStyle/>
+          <a:p>
+            <a:r>
+              <a:rPr lang="en-US" dirty="0"/>
+              <a:t>The class </a:t>
+            </a:r>
+            <a:r>
+              <a:rPr lang="en-US" dirty="0" err="1"/>
+              <a:t>BigFloat</a:t>
+            </a:r>
+            <a:r>
+              <a:rPr lang="en-US" dirty="0"/>
+              <a:t> is an infinite precision floating point type.</a:t>
+            </a:r>
+          </a:p>
+        </p:txBody>
+      </p:sp>
+      <p:sp>
+        <p:nvSpPr>
+          <p:cNvPr id="4" name="TextBox 3">
+            <a:extLst>
+              <a:ext uri="{FF2B5EF4-FFF2-40B4-BE49-F238E27FC236}">
+                <a16:creationId xmlns:a16="http://schemas.microsoft.com/office/drawing/2014/main" id="{F263C9E3-8273-8CC2-0AE3-82978A8039FF}"/>
+              </a:ext>
+            </a:extLst>
+          </p:cNvPr>
+          <p:cNvSpPr txBox="1"/>
+          <p:nvPr/>
+        </p:nvSpPr>
+        <p:spPr>
+          <a:xfrm>
+            <a:off x="838200" y="2708632"/>
+            <a:ext cx="10189008" cy="3416320"/>
+          </a:xfrm>
+          <a:prstGeom prst="rect">
+            <a:avLst/>
+          </a:prstGeom>
+          <a:noFill/>
+        </p:spPr>
+        <p:txBody>
+          <a:bodyPr wrap="none" rtlCol="0">
+            <a:spAutoFit/>
+          </a:bodyPr>
+          <a:lstStyle/>
+          <a:p>
+            <a:r>
+              <a:rPr lang="en-US" dirty="0" err="1">
+                <a:latin typeface="Consolas" panose="020B0609020204030204" pitchFamily="49" charset="0"/>
+                <a:cs typeface="Consolas" panose="020B0609020204030204" pitchFamily="49" charset="0"/>
+              </a:rPr>
+              <a:t>BigFloat</a:t>
+            </a:r>
+            <a:r>
+              <a:rPr lang="en-US" dirty="0">
+                <a:latin typeface="Consolas" panose="020B0609020204030204" pitchFamily="49" charset="0"/>
+                <a:cs typeface="Consolas" panose="020B0609020204030204" pitchFamily="49" charset="0"/>
+              </a:rPr>
+              <a:t> pi{ “3.14159 26535 89793 23846 26433 </a:t>
+            </a:r>
+            <a:r>
+              <a:rPr lang="en-US" b="0" i="0" dirty="0">
+                <a:solidFill>
+                  <a:srgbClr val="444746"/>
+                </a:solidFill>
+                <a:effectLst/>
+                <a:latin typeface="Consolas" panose="020B0609020204030204" pitchFamily="49" charset="0"/>
+                <a:cs typeface="Consolas" panose="020B0609020204030204" pitchFamily="49" charset="0"/>
+              </a:rPr>
+              <a:t>83279 50288 41971 69399 37510</a:t>
+            </a:r>
+            <a:r>
+              <a:rPr lang="en-US" dirty="0">
+                <a:latin typeface="Consolas" panose="020B0609020204030204" pitchFamily="49" charset="0"/>
+                <a:cs typeface="Consolas" panose="020B0609020204030204" pitchFamily="49" charset="0"/>
+              </a:rPr>
+              <a:t>” };</a:t>
+            </a:r>
+          </a:p>
+          <a:p>
+            <a:r>
+              <a:rPr lang="en-US" dirty="0">
+                <a:latin typeface="Consolas" panose="020B0609020204030204" pitchFamily="49" charset="0"/>
+                <a:cs typeface="Consolas" panose="020B0609020204030204" pitchFamily="49" charset="0"/>
+              </a:rPr>
+              <a:t>  // I assume </a:t>
+            </a:r>
+            <a:r>
+              <a:rPr lang="en-US" dirty="0" err="1">
+                <a:latin typeface="Consolas" panose="020B0609020204030204" pitchFamily="49" charset="0"/>
+                <a:cs typeface="Consolas" panose="020B0609020204030204" pitchFamily="49" charset="0"/>
+              </a:rPr>
+              <a:t>BigFloat</a:t>
+            </a:r>
+            <a:r>
+              <a:rPr lang="en-US" dirty="0">
+                <a:latin typeface="Consolas" panose="020B0609020204030204" pitchFamily="49" charset="0"/>
+                <a:cs typeface="Consolas" panose="020B0609020204030204" pitchFamily="49" charset="0"/>
+              </a:rPr>
+              <a:t> has a constructor that can handle the string above.</a:t>
+            </a:r>
+          </a:p>
+          <a:p>
+            <a:endParaRPr lang="en-US" dirty="0">
+              <a:latin typeface="Consolas" panose="020B0609020204030204" pitchFamily="49" charset="0"/>
+              <a:cs typeface="Consolas" panose="020B0609020204030204" pitchFamily="49" charset="0"/>
+            </a:endParaRPr>
+          </a:p>
+          <a:p>
+            <a:r>
+              <a:rPr lang="en-US" b="1" dirty="0">
+                <a:latin typeface="Consolas" panose="020B0609020204030204" pitchFamily="49" charset="0"/>
+                <a:cs typeface="Consolas" panose="020B0609020204030204" pitchFamily="49" charset="0"/>
+              </a:rPr>
+              <a:t>double</a:t>
+            </a:r>
+            <a:r>
+              <a:rPr lang="en-US" dirty="0">
+                <a:latin typeface="Consolas" panose="020B0609020204030204" pitchFamily="49" charset="0"/>
+                <a:cs typeface="Consolas" panose="020B0609020204030204" pitchFamily="49" charset="0"/>
+              </a:rPr>
+              <a:t> </a:t>
+            </a:r>
+            <a:r>
+              <a:rPr lang="en-US" dirty="0" err="1">
+                <a:latin typeface="Consolas" panose="020B0609020204030204" pitchFamily="49" charset="0"/>
+                <a:cs typeface="Consolas" panose="020B0609020204030204" pitchFamily="49" charset="0"/>
+              </a:rPr>
+              <a:t>approximate_pi</a:t>
+            </a:r>
+            <a:r>
+              <a:rPr lang="en-US" dirty="0">
+                <a:latin typeface="Consolas" panose="020B0609020204030204" pitchFamily="49" charset="0"/>
+                <a:cs typeface="Consolas" panose="020B0609020204030204" pitchFamily="49" charset="0"/>
+              </a:rPr>
+              <a:t> = pi;   // Calls </a:t>
+            </a:r>
+            <a:r>
+              <a:rPr lang="en-US" dirty="0" err="1">
+                <a:latin typeface="Consolas" panose="020B0609020204030204" pitchFamily="49" charset="0"/>
+                <a:cs typeface="Consolas" panose="020B0609020204030204" pitchFamily="49" charset="0"/>
+              </a:rPr>
+              <a:t>BigFloat</a:t>
+            </a:r>
+            <a:r>
+              <a:rPr lang="en-US" dirty="0">
+                <a:latin typeface="Consolas" panose="020B0609020204030204" pitchFamily="49" charset="0"/>
+                <a:cs typeface="Consolas" panose="020B0609020204030204" pitchFamily="49" charset="0"/>
+              </a:rPr>
+              <a:t>::operator double( )</a:t>
+            </a:r>
+          </a:p>
+          <a:p>
+            <a:r>
+              <a:rPr lang="en-US" dirty="0">
+                <a:latin typeface="Consolas" panose="020B0609020204030204" pitchFamily="49" charset="0"/>
+                <a:cs typeface="Consolas" panose="020B0609020204030204" pitchFamily="49" charset="0"/>
+              </a:rPr>
+              <a:t>                              // No warning about precision loss</a:t>
+            </a:r>
+          </a:p>
+          <a:p>
+            <a:r>
+              <a:rPr lang="en-US" dirty="0">
+                <a:latin typeface="Consolas" panose="020B0609020204030204" pitchFamily="49" charset="0"/>
+                <a:cs typeface="Consolas" panose="020B0609020204030204" pitchFamily="49" charset="0"/>
+              </a:rPr>
+              <a:t>                              // Compiler doesn’t know what the conversion does</a:t>
+            </a:r>
+          </a:p>
+          <a:p>
+            <a:endParaRPr lang="en-US" dirty="0">
+              <a:latin typeface="Consolas" panose="020B0609020204030204" pitchFamily="49" charset="0"/>
+              <a:cs typeface="Consolas" panose="020B0609020204030204" pitchFamily="49" charset="0"/>
+            </a:endParaRPr>
+          </a:p>
+          <a:p>
+            <a:endParaRPr lang="en-US" dirty="0">
+              <a:latin typeface="Consolas" panose="020B0609020204030204" pitchFamily="49" charset="0"/>
+              <a:cs typeface="Consolas" panose="020B0609020204030204" pitchFamily="49" charset="0"/>
+            </a:endParaRPr>
+          </a:p>
+          <a:p>
+            <a:r>
+              <a:rPr lang="en-US" b="1" dirty="0">
+                <a:latin typeface="Consolas" panose="020B0609020204030204" pitchFamily="49" charset="0"/>
+                <a:cs typeface="Consolas" panose="020B0609020204030204" pitchFamily="49" charset="0"/>
+              </a:rPr>
+              <a:t>void</a:t>
+            </a:r>
+            <a:r>
+              <a:rPr lang="en-US" dirty="0">
+                <a:latin typeface="Consolas" panose="020B0609020204030204" pitchFamily="49" charset="0"/>
+                <a:cs typeface="Consolas" panose="020B0609020204030204" pitchFamily="49" charset="0"/>
+              </a:rPr>
+              <a:t> </a:t>
+            </a:r>
+            <a:r>
+              <a:rPr lang="en-US" dirty="0" err="1">
+                <a:latin typeface="Consolas" panose="020B0609020204030204" pitchFamily="49" charset="0"/>
+                <a:cs typeface="Consolas" panose="020B0609020204030204" pitchFamily="49" charset="0"/>
+              </a:rPr>
+              <a:t>process_number</a:t>
+            </a:r>
+            <a:r>
+              <a:rPr lang="en-US" dirty="0">
+                <a:latin typeface="Consolas" panose="020B0609020204030204" pitchFamily="49" charset="0"/>
+                <a:cs typeface="Consolas" panose="020B0609020204030204" pitchFamily="49" charset="0"/>
+              </a:rPr>
+              <a:t>( </a:t>
+            </a:r>
+            <a:r>
+              <a:rPr lang="en-US" b="1" dirty="0">
+                <a:latin typeface="Consolas" panose="020B0609020204030204" pitchFamily="49" charset="0"/>
+                <a:cs typeface="Consolas" panose="020B0609020204030204" pitchFamily="49" charset="0"/>
+              </a:rPr>
+              <a:t>double</a:t>
+            </a:r>
+            <a:r>
+              <a:rPr lang="en-US" dirty="0">
+                <a:latin typeface="Consolas" panose="020B0609020204030204" pitchFamily="49" charset="0"/>
+                <a:cs typeface="Consolas" panose="020B0609020204030204" pitchFamily="49" charset="0"/>
+              </a:rPr>
+              <a:t> </a:t>
+            </a:r>
+            <a:r>
+              <a:rPr lang="en-US" dirty="0" err="1">
+                <a:latin typeface="Consolas" panose="020B0609020204030204" pitchFamily="49" charset="0"/>
+                <a:cs typeface="Consolas" panose="020B0609020204030204" pitchFamily="49" charset="0"/>
+              </a:rPr>
+              <a:t>process_me</a:t>
+            </a:r>
+            <a:r>
+              <a:rPr lang="en-US" dirty="0">
+                <a:latin typeface="Consolas" panose="020B0609020204030204" pitchFamily="49" charset="0"/>
+                <a:cs typeface="Consolas" panose="020B0609020204030204" pitchFamily="49" charset="0"/>
+              </a:rPr>
+              <a:t> );</a:t>
+            </a:r>
+          </a:p>
+          <a:p>
+            <a:endParaRPr lang="en-US" dirty="0">
+              <a:latin typeface="Consolas" panose="020B0609020204030204" pitchFamily="49" charset="0"/>
+              <a:cs typeface="Consolas" panose="020B0609020204030204" pitchFamily="49" charset="0"/>
+            </a:endParaRPr>
+          </a:p>
+          <a:p>
+            <a:r>
+              <a:rPr lang="en-US" dirty="0" err="1">
+                <a:latin typeface="Consolas" panose="020B0609020204030204" pitchFamily="49" charset="0"/>
+                <a:cs typeface="Consolas" panose="020B0609020204030204" pitchFamily="49" charset="0"/>
+              </a:rPr>
+              <a:t>process_number</a:t>
+            </a:r>
+            <a:r>
+              <a:rPr lang="en-US" dirty="0">
+                <a:latin typeface="Consolas" panose="020B0609020204030204" pitchFamily="49" charset="0"/>
+                <a:cs typeface="Consolas" panose="020B0609020204030204" pitchFamily="49" charset="0"/>
+              </a:rPr>
+              <a:t>( pi );         // Calls </a:t>
+            </a:r>
+            <a:r>
+              <a:rPr lang="en-US" dirty="0" err="1">
+                <a:latin typeface="Consolas" panose="020B0609020204030204" pitchFamily="49" charset="0"/>
+                <a:cs typeface="Consolas" panose="020B0609020204030204" pitchFamily="49" charset="0"/>
+              </a:rPr>
+              <a:t>BigFloat</a:t>
+            </a:r>
+            <a:r>
+              <a:rPr lang="en-US" dirty="0">
+                <a:latin typeface="Consolas" panose="020B0609020204030204" pitchFamily="49" charset="0"/>
+                <a:cs typeface="Consolas" panose="020B0609020204030204" pitchFamily="49" charset="0"/>
+              </a:rPr>
+              <a:t>::operator double( )</a:t>
+            </a:r>
+          </a:p>
+          <a:p>
+            <a:r>
+              <a:rPr lang="en-US" dirty="0">
+                <a:latin typeface="Consolas" panose="020B0609020204030204" pitchFamily="49" charset="0"/>
+                <a:cs typeface="Consolas" panose="020B0609020204030204" pitchFamily="49" charset="0"/>
+              </a:rPr>
+              <a:t>                              // Again, no warning about precision loss</a:t>
+            </a:r>
+          </a:p>
+        </p:txBody>
+      </p:sp>
+    </p:spTree>
+    <p:extLst>
+      <p:ext uri="{BB962C8B-B14F-4D97-AF65-F5344CB8AC3E}">
+        <p14:creationId xmlns:p14="http://schemas.microsoft.com/office/powerpoint/2010/main" val="1351380157"/>
       </p:ext>
     </p:extLst>
   </p:cSld>
@@ -3459,143 +7003,199 @@
             <a:br>
               <a:rPr lang="en-US" dirty="0"/>
             </a:br>
-            <a:r>
-              <a:rPr lang="en-US" sz="1600" dirty="0"/>
-              <a:t> </a:t>
-            </a:r>
             <a:br>
               <a:rPr lang="en-US" dirty="0"/>
-            </a:br>
-            <a:r>
-              <a:rPr lang="en-US" sz="2000" dirty="0">
-                <a:latin typeface="Consolas" panose="020B0609020204030204" pitchFamily="49" charset="0"/>
-                <a:cs typeface="Consolas" panose="020B0609020204030204" pitchFamily="49" charset="0"/>
-              </a:rPr>
-              <a:t>double pi = 3.14159;</a:t>
-            </a:r>
-            <a:br>
-              <a:rPr lang="en-US" sz="2000" dirty="0">
-                <a:latin typeface="Consolas" panose="020B0609020204030204" pitchFamily="49" charset="0"/>
-                <a:cs typeface="Consolas" panose="020B0609020204030204" pitchFamily="49" charset="0"/>
-              </a:rPr>
-            </a:br>
-            <a:r>
-              <a:rPr lang="en-US" sz="2000" dirty="0">
-                <a:latin typeface="Consolas" panose="020B0609020204030204" pitchFamily="49" charset="0"/>
-                <a:cs typeface="Consolas" panose="020B0609020204030204" pitchFamily="49" charset="0"/>
-              </a:rPr>
-              <a:t>int </a:t>
-            </a:r>
-            <a:r>
-              <a:rPr lang="en-US" sz="2000" dirty="0" err="1">
-                <a:latin typeface="Consolas" panose="020B0609020204030204" pitchFamily="49" charset="0"/>
-                <a:cs typeface="Consolas" panose="020B0609020204030204" pitchFamily="49" charset="0"/>
-              </a:rPr>
-              <a:t>approximate_pi</a:t>
-            </a:r>
-            <a:r>
-              <a:rPr lang="en-US" sz="2000" dirty="0">
-                <a:latin typeface="Consolas" panose="020B0609020204030204" pitchFamily="49" charset="0"/>
-                <a:cs typeface="Consolas" panose="020B0609020204030204" pitchFamily="49" charset="0"/>
-              </a:rPr>
-              <a:t> = *(int *)&amp;pi;</a:t>
-            </a:r>
-            <a:br>
-              <a:rPr lang="en-US" sz="2000" dirty="0">
-                <a:latin typeface="Consolas" panose="020B0609020204030204" pitchFamily="49" charset="0"/>
-                <a:cs typeface="Consolas" panose="020B0609020204030204" pitchFamily="49" charset="0"/>
-              </a:rPr>
             </a:br>
             <a:br>
-              <a:rPr lang="en-US" sz="2000" dirty="0">
-                <a:latin typeface="Consolas" panose="020B0609020204030204" pitchFamily="49" charset="0"/>
-                <a:cs typeface="Consolas" panose="020B0609020204030204" pitchFamily="49" charset="0"/>
-              </a:rPr>
+              <a:rPr lang="en-US" dirty="0"/>
             </a:br>
-            <a:r>
-              <a:rPr lang="en-US" sz="2000" dirty="0">
+            <a:br>
+              <a:rPr lang="en-US" dirty="0"/>
+            </a:br>
+            <a:br>
+              <a:rPr lang="en-US" dirty="0"/>
+            </a:br>
+            <a:br>
+              <a:rPr lang="en-US" dirty="0"/>
+            </a:br>
+            <a:endParaRPr lang="en-US" dirty="0"/>
+          </a:p>
+          <a:p>
+            <a:r>
+              <a:rPr lang="en-US" dirty="0">
+                <a:cs typeface="Consolas" panose="020B0609020204030204" pitchFamily="49" charset="0"/>
+              </a:rPr>
+              <a:t>The second example is a normal thing to do in C programs.</a:t>
+            </a:r>
+          </a:p>
+          <a:p>
+            <a:r>
+              <a:rPr lang="en-US" dirty="0">
+                <a:cs typeface="Consolas" panose="020B0609020204030204" pitchFamily="49" charset="0"/>
+              </a:rPr>
+              <a:t>The first example is just broken on machines with 32-bit integers (why?)</a:t>
+            </a:r>
+          </a:p>
+        </p:txBody>
+      </p:sp>
+      <p:sp>
+        <p:nvSpPr>
+          <p:cNvPr id="4" name="TextBox 3">
+            <a:extLst>
+              <a:ext uri="{FF2B5EF4-FFF2-40B4-BE49-F238E27FC236}">
+                <a16:creationId xmlns:a16="http://schemas.microsoft.com/office/drawing/2014/main" id="{334B7C76-BFB9-B151-FB14-C293881F67FD}"/>
+              </a:ext>
+            </a:extLst>
+          </p:cNvPr>
+          <p:cNvSpPr txBox="1"/>
+          <p:nvPr/>
+        </p:nvSpPr>
+        <p:spPr>
+          <a:xfrm>
+            <a:off x="1132114" y="2492829"/>
+            <a:ext cx="8669361" cy="2031325"/>
+          </a:xfrm>
+          <a:prstGeom prst="rect">
+            <a:avLst/>
+          </a:prstGeom>
+          <a:noFill/>
+        </p:spPr>
+        <p:txBody>
+          <a:bodyPr wrap="none" rtlCol="0">
+            <a:spAutoFit/>
+          </a:bodyPr>
+          <a:lstStyle/>
+          <a:p>
+            <a:r>
+              <a:rPr lang="en-US" sz="1800" dirty="0">
+                <a:latin typeface="Consolas" panose="020B0609020204030204" pitchFamily="49" charset="0"/>
+                <a:cs typeface="Consolas" panose="020B0609020204030204" pitchFamily="49" charset="0"/>
+              </a:rPr>
+              <a:t>double pi = 3.14159;</a:t>
+            </a:r>
+            <a:br>
+              <a:rPr lang="en-US" sz="1800" dirty="0">
+                <a:latin typeface="Consolas" panose="020B0609020204030204" pitchFamily="49" charset="0"/>
+                <a:cs typeface="Consolas" panose="020B0609020204030204" pitchFamily="49" charset="0"/>
+              </a:rPr>
+            </a:br>
+            <a:r>
+              <a:rPr lang="en-US" sz="1800" dirty="0">
+                <a:latin typeface="Consolas" panose="020B0609020204030204" pitchFamily="49" charset="0"/>
+                <a:cs typeface="Consolas" panose="020B0609020204030204" pitchFamily="49" charset="0"/>
+              </a:rPr>
+              <a:t>int </a:t>
+            </a:r>
+            <a:r>
+              <a:rPr lang="en-US" sz="1800" dirty="0" err="1">
+                <a:latin typeface="Consolas" panose="020B0609020204030204" pitchFamily="49" charset="0"/>
+                <a:cs typeface="Consolas" panose="020B0609020204030204" pitchFamily="49" charset="0"/>
+              </a:rPr>
+              <a:t>approximate_pi</a:t>
+            </a:r>
+            <a:r>
+              <a:rPr lang="en-US" sz="1800" dirty="0">
+                <a:latin typeface="Consolas" panose="020B0609020204030204" pitchFamily="49" charset="0"/>
+                <a:cs typeface="Consolas" panose="020B0609020204030204" pitchFamily="49" charset="0"/>
+              </a:rPr>
+              <a:t> = *(int *)&amp;pi;</a:t>
+            </a:r>
+            <a:br>
+              <a:rPr lang="en-US" sz="1800" dirty="0">
+                <a:latin typeface="Consolas" panose="020B0609020204030204" pitchFamily="49" charset="0"/>
+                <a:cs typeface="Consolas" panose="020B0609020204030204" pitchFamily="49" charset="0"/>
+              </a:rPr>
+            </a:br>
+            <a:br>
+              <a:rPr lang="en-US" sz="1800" dirty="0">
+                <a:latin typeface="Consolas" panose="020B0609020204030204" pitchFamily="49" charset="0"/>
+                <a:cs typeface="Consolas" panose="020B0609020204030204" pitchFamily="49" charset="0"/>
+              </a:rPr>
+            </a:br>
+            <a:r>
+              <a:rPr lang="en-US" sz="1800" dirty="0">
                 <a:latin typeface="Consolas" panose="020B0609020204030204" pitchFamily="49" charset="0"/>
                 <a:cs typeface="Consolas" panose="020B0609020204030204" pitchFamily="49" charset="0"/>
               </a:rPr>
               <a:t>unsigned long </a:t>
             </a:r>
             <a:r>
-              <a:rPr lang="en-US" sz="2000" dirty="0" err="1">
+              <a:rPr lang="en-US" sz="1800" dirty="0" err="1">
                 <a:latin typeface="Consolas" panose="020B0609020204030204" pitchFamily="49" charset="0"/>
                 <a:cs typeface="Consolas" panose="020B0609020204030204" pitchFamily="49" charset="0"/>
               </a:rPr>
               <a:t>hardware_address</a:t>
             </a:r>
             <a:r>
-              <a:rPr lang="en-US" sz="2000" dirty="0">
+              <a:rPr lang="en-US" sz="1800" dirty="0">
                 <a:latin typeface="Consolas" panose="020B0609020204030204" pitchFamily="49" charset="0"/>
                 <a:cs typeface="Consolas" panose="020B0609020204030204" pitchFamily="49" charset="0"/>
               </a:rPr>
               <a:t> = 0xFFFF001C;</a:t>
             </a:r>
             <a:br>
-              <a:rPr lang="en-US" sz="2000" dirty="0">
+              <a:rPr lang="en-US" sz="1800" dirty="0">
                 <a:latin typeface="Consolas" panose="020B0609020204030204" pitchFamily="49" charset="0"/>
                 <a:cs typeface="Consolas" panose="020B0609020204030204" pitchFamily="49" charset="0"/>
               </a:rPr>
             </a:br>
             <a:r>
-              <a:rPr lang="en-US" sz="2000" dirty="0">
+              <a:rPr lang="en-US" sz="1800" dirty="0">
                 <a:latin typeface="Consolas" panose="020B0609020204030204" pitchFamily="49" charset="0"/>
                 <a:cs typeface="Consolas" panose="020B0609020204030204" pitchFamily="49" charset="0"/>
               </a:rPr>
               <a:t>unsigned char *</a:t>
             </a:r>
             <a:r>
-              <a:rPr lang="en-US" sz="2000" dirty="0" err="1">
+              <a:rPr lang="en-US" sz="1800" dirty="0" err="1">
                 <a:latin typeface="Consolas" panose="020B0609020204030204" pitchFamily="49" charset="0"/>
                 <a:cs typeface="Consolas" panose="020B0609020204030204" pitchFamily="49" charset="0"/>
               </a:rPr>
               <a:t>device_register</a:t>
             </a:r>
             <a:r>
-              <a:rPr lang="en-US" sz="2000" dirty="0">
+              <a:rPr lang="en-US" sz="1800" dirty="0">
                 <a:latin typeface="Consolas" panose="020B0609020204030204" pitchFamily="49" charset="0"/>
                 <a:cs typeface="Consolas" panose="020B0609020204030204" pitchFamily="49" charset="0"/>
               </a:rPr>
               <a:t> = (unsigned char *)</a:t>
             </a:r>
             <a:r>
-              <a:rPr lang="en-US" sz="2000" dirty="0" err="1">
+              <a:rPr lang="en-US" sz="1800" dirty="0" err="1">
                 <a:latin typeface="Consolas" panose="020B0609020204030204" pitchFamily="49" charset="0"/>
                 <a:cs typeface="Consolas" panose="020B0609020204030204" pitchFamily="49" charset="0"/>
               </a:rPr>
               <a:t>hardware_address</a:t>
             </a:r>
             <a:r>
-              <a:rPr lang="en-US" sz="2000" dirty="0">
+              <a:rPr lang="en-US" sz="1800" dirty="0">
                 <a:latin typeface="Consolas" panose="020B0609020204030204" pitchFamily="49" charset="0"/>
                 <a:cs typeface="Consolas" panose="020B0609020204030204" pitchFamily="49" charset="0"/>
               </a:rPr>
               <a:t>;</a:t>
             </a:r>
             <a:br>
-              <a:rPr lang="en-US" sz="2000" dirty="0">
+              <a:rPr lang="en-US" sz="1800" dirty="0">
                 <a:latin typeface="Consolas" panose="020B0609020204030204" pitchFamily="49" charset="0"/>
                 <a:cs typeface="Consolas" panose="020B0609020204030204" pitchFamily="49" charset="0"/>
               </a:rPr>
             </a:br>
             <a:r>
-              <a:rPr lang="en-US" sz="2000" dirty="0">
+              <a:rPr lang="en-US" sz="1800" dirty="0">
                 <a:latin typeface="Consolas" panose="020B0609020204030204" pitchFamily="49" charset="0"/>
                 <a:cs typeface="Consolas" panose="020B0609020204030204" pitchFamily="49" charset="0"/>
               </a:rPr>
               <a:t>*</a:t>
             </a:r>
             <a:r>
-              <a:rPr lang="en-US" sz="2000" dirty="0" err="1">
+              <a:rPr lang="en-US" sz="1800" dirty="0" err="1">
                 <a:latin typeface="Consolas" panose="020B0609020204030204" pitchFamily="49" charset="0"/>
                 <a:cs typeface="Consolas" panose="020B0609020204030204" pitchFamily="49" charset="0"/>
               </a:rPr>
               <a:t>device_register</a:t>
             </a:r>
             <a:r>
-              <a:rPr lang="en-US" sz="2000" dirty="0">
+              <a:rPr lang="en-US" sz="1800" dirty="0">
                 <a:latin typeface="Consolas" panose="020B0609020204030204" pitchFamily="49" charset="0"/>
                 <a:cs typeface="Consolas" panose="020B0609020204030204" pitchFamily="49" charset="0"/>
               </a:rPr>
@@ -3603,21 +7203,7 @@
             </a:r>
           </a:p>
           <a:p>
-            <a:r>
-              <a:rPr lang="en-US" dirty="0">
-                <a:cs typeface="Consolas" panose="020B0609020204030204" pitchFamily="49" charset="0"/>
-              </a:rPr>
-              <a:t>The second example is a normal thing to do in C programs.</a:t>
-            </a:r>
-          </a:p>
-          <a:p>
-            <a:pPr lvl="1"/>
-            <a:r>
-              <a:rPr lang="en-US" dirty="0">
-                <a:cs typeface="Consolas" panose="020B0609020204030204" pitchFamily="49" charset="0"/>
-              </a:rPr>
-              <a:t>The first example is just broken on machines with 32-bit integers (why?)</a:t>
-            </a:r>
+            <a:endParaRPr lang="en-US" dirty="0"/>
           </a:p>
         </p:txBody>
       </p:sp>
@@ -4128,68 +7714,121 @@
             <a:br>
               <a:rPr lang="en-US" dirty="0"/>
             </a:br>
-            <a:r>
-              <a:rPr lang="en-US" sz="1600" dirty="0"/>
-              <a:t> </a:t>
-            </a:r>
             <a:br>
               <a:rPr lang="en-US" dirty="0"/>
             </a:br>
-            <a:r>
-              <a:rPr lang="en-US" sz="2000" dirty="0">
+            <a:br>
+              <a:rPr lang="en-US" dirty="0"/>
+            </a:br>
+            <a:br>
+              <a:rPr lang="en-US" dirty="0"/>
+            </a:br>
+            <a:endParaRPr lang="en-US" dirty="0"/>
+          </a:p>
+          <a:p>
+            <a:r>
+              <a:rPr lang="en-US" dirty="0"/>
+              <a:t>There are times when temporarily removing constant-ness is useful…</a:t>
+            </a:r>
+          </a:p>
+          <a:p>
+            <a:pPr lvl="1"/>
+            <a:r>
+              <a:rPr lang="en-US" dirty="0"/>
+              <a:t>… when you know what the pointer is really pointing at, and you are going after a special effect.</a:t>
+            </a:r>
+          </a:p>
+          <a:p>
+            <a:r>
+              <a:rPr lang="en-US" dirty="0"/>
+              <a:t>That doesn’t mean you want an unsafe, ill-defined conversion of the data!</a:t>
+            </a:r>
+          </a:p>
+        </p:txBody>
+      </p:sp>
+      <p:sp>
+        <p:nvSpPr>
+          <p:cNvPr id="4" name="TextBox 3">
+            <a:extLst>
+              <a:ext uri="{FF2B5EF4-FFF2-40B4-BE49-F238E27FC236}">
+                <a16:creationId xmlns:a16="http://schemas.microsoft.com/office/drawing/2014/main" id="{DDE686C5-EB7B-B2B8-B707-92D1635083EB}"/>
+              </a:ext>
+            </a:extLst>
+          </p:cNvPr>
+          <p:cNvSpPr txBox="1"/>
+          <p:nvPr/>
+        </p:nvSpPr>
+        <p:spPr>
+          <a:xfrm>
+            <a:off x="1230085" y="2438400"/>
+            <a:ext cx="8289449" cy="1477328"/>
+          </a:xfrm>
+          <a:prstGeom prst="rect">
+            <a:avLst/>
+          </a:prstGeom>
+          <a:noFill/>
+        </p:spPr>
+        <p:txBody>
+          <a:bodyPr wrap="none" rtlCol="0">
+            <a:spAutoFit/>
+          </a:bodyPr>
+          <a:lstStyle/>
+          <a:p>
+            <a:r>
+              <a:rPr lang="en-US" sz="1800" dirty="0">
                 <a:latin typeface="Consolas" panose="020B0609020204030204" pitchFamily="49" charset="0"/>
                 <a:cs typeface="Consolas" panose="020B0609020204030204" pitchFamily="49" charset="0"/>
               </a:rPr>
               <a:t>void f( const char *pc ) {</a:t>
             </a:r>
             <a:br>
-              <a:rPr lang="en-US" sz="2000" dirty="0">
+              <a:rPr lang="en-US" sz="1800" dirty="0">
                 <a:latin typeface="Consolas" panose="020B0609020204030204" pitchFamily="49" charset="0"/>
                 <a:cs typeface="Consolas" panose="020B0609020204030204" pitchFamily="49" charset="0"/>
               </a:rPr>
             </a:br>
             <a:r>
-              <a:rPr lang="en-US" sz="2000" dirty="0">
+              <a:rPr lang="en-US" sz="1800" dirty="0">
                 <a:latin typeface="Consolas" panose="020B0609020204030204" pitchFamily="49" charset="0"/>
                 <a:cs typeface="Consolas" panose="020B0609020204030204" pitchFamily="49" charset="0"/>
               </a:rPr>
               <a:t>    char *p = </a:t>
             </a:r>
             <a:r>
-              <a:rPr lang="en-US" sz="2000" dirty="0" err="1">
+              <a:rPr lang="en-US" sz="1800" dirty="0" err="1">
                 <a:latin typeface="Consolas" panose="020B0609020204030204" pitchFamily="49" charset="0"/>
                 <a:cs typeface="Consolas" panose="020B0609020204030204" pitchFamily="49" charset="0"/>
               </a:rPr>
               <a:t>const_cast</a:t>
             </a:r>
             <a:r>
-              <a:rPr lang="en-US" sz="2000" dirty="0">
+              <a:rPr lang="en-US" sz="1800" dirty="0">
                 <a:latin typeface="Consolas" panose="020B0609020204030204" pitchFamily="49" charset="0"/>
                 <a:cs typeface="Consolas" panose="020B0609020204030204" pitchFamily="49" charset="0"/>
               </a:rPr>
               <a:t>&lt;char *&gt;( pc );  // No error or warning.</a:t>
             </a:r>
             <a:br>
-              <a:rPr lang="en-US" sz="2000" dirty="0">
+              <a:rPr lang="en-US" sz="1800" dirty="0">
                 <a:latin typeface="Consolas" panose="020B0609020204030204" pitchFamily="49" charset="0"/>
                 <a:cs typeface="Consolas" panose="020B0609020204030204" pitchFamily="49" charset="0"/>
               </a:rPr>
             </a:br>
             <a:r>
-              <a:rPr lang="en-US" sz="2000" dirty="0">
+              <a:rPr lang="en-US" sz="1800" dirty="0">
                 <a:latin typeface="Consolas" panose="020B0609020204030204" pitchFamily="49" charset="0"/>
                 <a:cs typeface="Consolas" panose="020B0609020204030204" pitchFamily="49" charset="0"/>
               </a:rPr>
               <a:t>    *p = ‘x’;   // Trying to modify a constant!</a:t>
             </a:r>
             <a:br>
-              <a:rPr lang="en-US" sz="2000" dirty="0">
+              <a:rPr lang="en-US" sz="1800" dirty="0">
                 <a:latin typeface="Consolas" panose="020B0609020204030204" pitchFamily="49" charset="0"/>
                 <a:cs typeface="Consolas" panose="020B0609020204030204" pitchFamily="49" charset="0"/>
               </a:rPr>
             </a:br>
             <a:r>
-              <a:rPr lang="en-US" sz="2000" dirty="0">
+              <a:rPr lang="en-US" sz="1800" dirty="0">
                 <a:latin typeface="Consolas" panose="020B0609020204030204" pitchFamily="49" charset="0"/>
                 <a:cs typeface="Consolas" panose="020B0609020204030204" pitchFamily="49" charset="0"/>
               </a:rPr>
@@ -4197,23 +7836,7 @@
             </a:r>
           </a:p>
           <a:p>
-            <a:r>
-              <a:rPr lang="en-US" dirty="0"/>
-              <a:t>There are times when temporarily removing constant-ness is useful…</a:t>
-            </a:r>
-          </a:p>
-          <a:p>
-            <a:pPr lvl="1"/>
-            <a:r>
-              <a:rPr lang="en-US" dirty="0"/>
-              <a:t>… when you know what the pointer is really pointing at, and you are going after a special effect.</a:t>
-            </a:r>
-          </a:p>
-          <a:p>
-            <a:r>
-              <a:rPr lang="en-US" dirty="0"/>
-              <a:t>That doesn’t mean you want an unsafe, ill-defined conversion of the data!</a:t>
-            </a:r>
+            <a:endParaRPr lang="en-US" dirty="0"/>
           </a:p>
         </p:txBody>
       </p:sp>
@@ -4294,7 +7917,7 @@
         <p:spPr/>
         <p:txBody>
           <a:bodyPr>
-            <a:normAutofit lnSpcReduction="10000"/>
+            <a:normAutofit/>
           </a:bodyPr>
           <a:lstStyle/>
           <a:p>
@@ -4317,138 +7940,199 @@
             <a:br>
               <a:rPr lang="en-US" dirty="0"/>
             </a:br>
-            <a:r>
-              <a:rPr lang="en-US" sz="1600" dirty="0"/>
-              <a:t> </a:t>
-            </a:r>
             <a:br>
               <a:rPr lang="en-US" dirty="0"/>
             </a:br>
-            <a:r>
-              <a:rPr lang="en-US" sz="2000" dirty="0">
+            <a:br>
+              <a:rPr lang="en-US" dirty="0"/>
+            </a:br>
+            <a:endParaRPr lang="en-US" sz="2000" dirty="0">
+              <a:latin typeface="Consolas" panose="020B0609020204030204" pitchFamily="49" charset="0"/>
+              <a:cs typeface="Consolas" panose="020B0609020204030204" pitchFamily="49" charset="0"/>
+            </a:endParaRPr>
+          </a:p>
+          <a:p>
+            <a:r>
+              <a:rPr lang="en-US" dirty="0"/>
+              <a:t>Can be used for special effects:</a:t>
+            </a:r>
+            <a:endParaRPr lang="en-US" sz="2000" dirty="0">
+              <a:latin typeface="Consolas" panose="020B0609020204030204" pitchFamily="49" charset="0"/>
+              <a:cs typeface="Consolas" panose="020B0609020204030204" pitchFamily="49" charset="0"/>
+            </a:endParaRPr>
+          </a:p>
+        </p:txBody>
+      </p:sp>
+      <p:sp>
+        <p:nvSpPr>
+          <p:cNvPr id="4" name="TextBox 3">
+            <a:extLst>
+              <a:ext uri="{FF2B5EF4-FFF2-40B4-BE49-F238E27FC236}">
+                <a16:creationId xmlns:a16="http://schemas.microsoft.com/office/drawing/2014/main" id="{B3961655-E2D2-8EAB-9666-6B85D35BE350}"/>
+              </a:ext>
+            </a:extLst>
+          </p:cNvPr>
+          <p:cNvSpPr txBox="1"/>
+          <p:nvPr/>
+        </p:nvSpPr>
+        <p:spPr>
+          <a:xfrm>
+            <a:off x="1262743" y="3830528"/>
+            <a:ext cx="6516528" cy="646331"/>
+          </a:xfrm>
+          <a:prstGeom prst="rect">
+            <a:avLst/>
+          </a:prstGeom>
+          <a:noFill/>
+        </p:spPr>
+        <p:txBody>
+          <a:bodyPr wrap="none" rtlCol="0">
+            <a:spAutoFit/>
+          </a:bodyPr>
+          <a:lstStyle/>
+          <a:p>
+            <a:r>
+              <a:rPr lang="en-US" sz="1800" dirty="0">
                 <a:latin typeface="Consolas" panose="020B0609020204030204" pitchFamily="49" charset="0"/>
                 <a:cs typeface="Consolas" panose="020B0609020204030204" pitchFamily="49" charset="0"/>
               </a:rPr>
               <a:t>unsigned char *</a:t>
             </a:r>
             <a:r>
-              <a:rPr lang="en-US" sz="2000" dirty="0" err="1">
+              <a:rPr lang="en-US" sz="1800" dirty="0" err="1">
                 <a:latin typeface="Consolas" panose="020B0609020204030204" pitchFamily="49" charset="0"/>
                 <a:cs typeface="Consolas" panose="020B0609020204030204" pitchFamily="49" charset="0"/>
               </a:rPr>
               <a:t>hardware_register</a:t>
             </a:r>
             <a:r>
-              <a:rPr lang="en-US" sz="2000" dirty="0">
+              <a:rPr lang="en-US" sz="1800" dirty="0">
                 <a:latin typeface="Consolas" panose="020B0609020204030204" pitchFamily="49" charset="0"/>
                 <a:cs typeface="Consolas" panose="020B0609020204030204" pitchFamily="49" charset="0"/>
               </a:rPr>
               <a:t> =</a:t>
             </a:r>
             <a:br>
-              <a:rPr lang="en-US" sz="2000" dirty="0">
+              <a:rPr lang="en-US" sz="1800" dirty="0">
                 <a:latin typeface="Consolas" panose="020B0609020204030204" pitchFamily="49" charset="0"/>
                 <a:cs typeface="Consolas" panose="020B0609020204030204" pitchFamily="49" charset="0"/>
               </a:rPr>
             </a:br>
             <a:r>
-              <a:rPr lang="en-US" sz="2000" dirty="0">
+              <a:rPr lang="en-US" sz="1800" dirty="0">
                 <a:latin typeface="Consolas" panose="020B0609020204030204" pitchFamily="49" charset="0"/>
                 <a:cs typeface="Consolas" panose="020B0609020204030204" pitchFamily="49" charset="0"/>
               </a:rPr>
               <a:t>  </a:t>
             </a:r>
             <a:r>
-              <a:rPr lang="en-US" sz="2000" dirty="0" err="1">
+              <a:rPr lang="en-US" sz="1800" dirty="0" err="1">
                 <a:latin typeface="Consolas" panose="020B0609020204030204" pitchFamily="49" charset="0"/>
                 <a:cs typeface="Consolas" panose="020B0609020204030204" pitchFamily="49" charset="0"/>
               </a:rPr>
               <a:t>reinterpret_cast</a:t>
             </a:r>
             <a:r>
-              <a:rPr lang="en-US" sz="2000" dirty="0">
+              <a:rPr lang="en-US" sz="1800" dirty="0">
                 <a:latin typeface="Consolas" panose="020B0609020204030204" pitchFamily="49" charset="0"/>
                 <a:cs typeface="Consolas" panose="020B0609020204030204" pitchFamily="49" charset="0"/>
               </a:rPr>
               <a:t>&lt;unsigned char *&gt;( 0xFFFF007E );</a:t>
             </a:r>
-          </a:p>
-          <a:p>
-            <a:r>
-              <a:rPr lang="en-US" dirty="0"/>
-              <a:t>Can be used for special effects:</a:t>
+            <a:endParaRPr lang="en-US" dirty="0"/>
+          </a:p>
+        </p:txBody>
+      </p:sp>
+      <p:sp>
+        <p:nvSpPr>
+          <p:cNvPr id="5" name="TextBox 4">
+            <a:extLst>
+              <a:ext uri="{FF2B5EF4-FFF2-40B4-BE49-F238E27FC236}">
+                <a16:creationId xmlns:a16="http://schemas.microsoft.com/office/drawing/2014/main" id="{410657BC-2EBA-CC75-B1E0-0822ACA7F59F}"/>
+              </a:ext>
+            </a:extLst>
+          </p:cNvPr>
+          <p:cNvSpPr txBox="1"/>
+          <p:nvPr/>
+        </p:nvSpPr>
+        <p:spPr>
+          <a:xfrm>
+            <a:off x="1262743" y="5388570"/>
+            <a:ext cx="9682459" cy="923330"/>
+          </a:xfrm>
+          <a:prstGeom prst="rect">
+            <a:avLst/>
+          </a:prstGeom>
+          <a:noFill/>
+        </p:spPr>
+        <p:txBody>
+          <a:bodyPr wrap="none" rtlCol="0">
+            <a:spAutoFit/>
+          </a:bodyPr>
+          <a:lstStyle/>
+          <a:p>
+            <a:r>
+              <a:rPr lang="en-US" sz="1800" dirty="0">
+                <a:latin typeface="Consolas" panose="020B0609020204030204" pitchFamily="49" charset="0"/>
+                <a:cs typeface="Consolas" panose="020B0609020204030204" pitchFamily="49" charset="0"/>
+              </a:rPr>
+              <a:t>double pi = 3.14159;        // Double precision is (almost always) 64 bits.</a:t>
             </a:r>
             <a:br>
-              <a:rPr lang="en-US" dirty="0"/>
+              <a:rPr lang="en-US" sz="1800" dirty="0">
+                <a:latin typeface="Consolas" panose="020B0609020204030204" pitchFamily="49" charset="0"/>
+                <a:cs typeface="Consolas" panose="020B0609020204030204" pitchFamily="49" charset="0"/>
+              </a:rPr>
             </a:br>
             <a:r>
-              <a:rPr lang="en-US" sz="1600" dirty="0"/>
-              <a:t> </a:t>
+              <a:rPr lang="en-US" sz="1800" dirty="0">
+                <a:latin typeface="Consolas" panose="020B0609020204030204" pitchFamily="49" charset="0"/>
+                <a:cs typeface="Consolas" panose="020B0609020204030204" pitchFamily="49" charset="0"/>
+              </a:rPr>
+              <a:t>unsigned long </a:t>
+            </a:r>
+            <a:r>
+              <a:rPr lang="en-US" sz="1800" dirty="0" err="1">
+                <a:latin typeface="Consolas" panose="020B0609020204030204" pitchFamily="49" charset="0"/>
+                <a:cs typeface="Consolas" panose="020B0609020204030204" pitchFamily="49" charset="0"/>
+              </a:rPr>
+              <a:t>raw_bits</a:t>
+            </a:r>
+            <a:r>
+              <a:rPr lang="en-US" sz="1800" dirty="0">
+                <a:latin typeface="Consolas" panose="020B0609020204030204" pitchFamily="49" charset="0"/>
+                <a:cs typeface="Consolas" panose="020B0609020204030204" pitchFamily="49" charset="0"/>
+              </a:rPr>
+              <a:t> =    // Assume unsigned long is 64 bits.</a:t>
             </a:r>
             <a:br>
-              <a:rPr lang="en-US" dirty="0"/>
+              <a:rPr lang="en-US" sz="1800" dirty="0">
+                <a:latin typeface="Consolas" panose="020B0609020204030204" pitchFamily="49" charset="0"/>
+                <a:cs typeface="Consolas" panose="020B0609020204030204" pitchFamily="49" charset="0"/>
+              </a:rPr>
             </a:br>
             <a:r>
-              <a:rPr lang="en-US" sz="2000" dirty="0">
-                <a:latin typeface="Consolas" panose="020B0609020204030204" pitchFamily="49" charset="0"/>
-                <a:cs typeface="Consolas" panose="020B0609020204030204" pitchFamily="49" charset="0"/>
-              </a:rPr>
-              <a:t>double pi = 3.14159;        // Double precision is (almost always) 64 bits.</a:t>
-            </a:r>
-            <a:br>
-              <a:rPr lang="en-US" sz="2000" dirty="0">
-                <a:latin typeface="Consolas" panose="020B0609020204030204" pitchFamily="49" charset="0"/>
-                <a:cs typeface="Consolas" panose="020B0609020204030204" pitchFamily="49" charset="0"/>
-              </a:rPr>
-            </a:br>
-            <a:r>
-              <a:rPr lang="en-US" sz="2000" dirty="0">
-                <a:latin typeface="Consolas" panose="020B0609020204030204" pitchFamily="49" charset="0"/>
-                <a:cs typeface="Consolas" panose="020B0609020204030204" pitchFamily="49" charset="0"/>
-              </a:rPr>
-              <a:t>unsigned long </a:t>
-            </a:r>
-            <a:r>
-              <a:rPr lang="en-US" sz="2000" dirty="0" err="1">
-                <a:latin typeface="Consolas" panose="020B0609020204030204" pitchFamily="49" charset="0"/>
-                <a:cs typeface="Consolas" panose="020B0609020204030204" pitchFamily="49" charset="0"/>
-              </a:rPr>
-              <a:t>raw_bits</a:t>
-            </a:r>
-            <a:r>
-              <a:rPr lang="en-US" sz="2000" dirty="0">
-                <a:latin typeface="Consolas" panose="020B0609020204030204" pitchFamily="49" charset="0"/>
-                <a:cs typeface="Consolas" panose="020B0609020204030204" pitchFamily="49" charset="0"/>
-              </a:rPr>
-              <a:t> =    // Assume unsigned long is 64 bits.</a:t>
-            </a:r>
-            <a:br>
-              <a:rPr lang="en-US" sz="2000" dirty="0">
-                <a:latin typeface="Consolas" panose="020B0609020204030204" pitchFamily="49" charset="0"/>
-                <a:cs typeface="Consolas" panose="020B0609020204030204" pitchFamily="49" charset="0"/>
-              </a:rPr>
-            </a:br>
-            <a:r>
-              <a:rPr lang="en-US" sz="2000" dirty="0">
+              <a:rPr lang="en-US" sz="1800" dirty="0">
                 <a:latin typeface="Consolas" panose="020B0609020204030204" pitchFamily="49" charset="0"/>
                 <a:cs typeface="Consolas" panose="020B0609020204030204" pitchFamily="49" charset="0"/>
               </a:rPr>
               <a:t>  </a:t>
             </a:r>
             <a:r>
-              <a:rPr lang="en-US" sz="2000" dirty="0" err="1">
+              <a:rPr lang="en-US" sz="1800" dirty="0" err="1">
                 <a:latin typeface="Consolas" panose="020B0609020204030204" pitchFamily="49" charset="0"/>
                 <a:cs typeface="Consolas" panose="020B0609020204030204" pitchFamily="49" charset="0"/>
               </a:rPr>
               <a:t>reinterpret_cast</a:t>
             </a:r>
             <a:r>
-              <a:rPr lang="en-US" sz="2000" dirty="0">
+              <a:rPr lang="en-US" sz="1800" dirty="0">
                 <a:latin typeface="Consolas" panose="020B0609020204030204" pitchFamily="49" charset="0"/>
                 <a:cs typeface="Consolas" panose="020B0609020204030204" pitchFamily="49" charset="0"/>
               </a:rPr>
               <a:t>&lt;unsigned long&gt;( pi );</a:t>
             </a:r>
+            <a:endParaRPr lang="en-US" dirty="0"/>
           </a:p>
         </p:txBody>
       </p:sp>
@@ -4534,6 +8218,21 @@
             <a:r>
               <a:rPr lang="en-US" dirty="0"/>
               <a:t>We won’t discuss dynamic casts in this class!</a:t>
+            </a:r>
+          </a:p>
+          <a:p>
+            <a:pPr lvl="1"/>
+            <a:r>
+              <a:rPr lang="en-US" dirty="0"/>
+              <a:t>They are used to </a:t>
+            </a:r>
+            <a:r>
+              <a:rPr lang="en-US" i="1" dirty="0"/>
+              <a:t>downcast</a:t>
+            </a:r>
+            <a:r>
+              <a:rPr lang="en-US" dirty="0"/>
+              <a:t> in an inheritance hierarchy.</a:t>
             </a:r>
           </a:p>
         </p:txBody>

</xml_diff>